<commit_message>
original character do not steal
</commit_message>
<xml_diff>
--- a/presentation/OpenGL ES 3.pptx
+++ b/presentation/OpenGL ES 3.pptx
@@ -1,9 +1,12 @@
 
 <file path=ppt/presentation.xml><?xml version="1.0" encoding="utf-8"?>
-<p:presentation xmlns:a="http://schemas.openxmlformats.org/drawingml/2006/main" xmlns:r="http://schemas.openxmlformats.org/officeDocument/2006/relationships" xmlns:p="http://schemas.openxmlformats.org/presentationml/2006/main" saveSubsetFonts="1">
+<p:presentation xmlns:a="http://schemas.openxmlformats.org/drawingml/2006/main" xmlns:r="http://schemas.openxmlformats.org/officeDocument/2006/relationships" xmlns:p="http://schemas.openxmlformats.org/presentationml/2006/main" showSpecialPlsOnTitleSld="0" saveSubsetFonts="1">
   <p:sldMasterIdLst>
-    <p:sldMasterId id="2147483648" r:id="rId1"/>
+    <p:sldMasterId id="2147483690" r:id="rId1"/>
   </p:sldMasterIdLst>
+  <p:notesMasterIdLst>
+    <p:notesMasterId r:id="rId8"/>
+  </p:notesMasterIdLst>
   <p:sldIdLst>
     <p:sldId id="256" r:id="rId2"/>
     <p:sldId id="257" r:id="rId3"/>
@@ -18,7 +21,7 @@
     <a:defPPr>
       <a:defRPr lang="en-US"/>
     </a:defPPr>
-    <a:lvl1pPr marL="0" algn="l" defTabSz="914400" rtl="0" eaLnBrk="1" latinLnBrk="0" hangingPunct="1">
+    <a:lvl1pPr marL="0" algn="l" defTabSz="457200" rtl="0" eaLnBrk="1" latinLnBrk="0" hangingPunct="1">
       <a:defRPr sz="1800" kern="1200">
         <a:solidFill>
           <a:schemeClr val="tx1"/>
@@ -28,7 +31,7 @@
         <a:cs typeface="+mn-cs"/>
       </a:defRPr>
     </a:lvl1pPr>
-    <a:lvl2pPr marL="457200" algn="l" defTabSz="914400" rtl="0" eaLnBrk="1" latinLnBrk="0" hangingPunct="1">
+    <a:lvl2pPr marL="457200" algn="l" defTabSz="457200" rtl="0" eaLnBrk="1" latinLnBrk="0" hangingPunct="1">
       <a:defRPr sz="1800" kern="1200">
         <a:solidFill>
           <a:schemeClr val="tx1"/>
@@ -38,7 +41,7 @@
         <a:cs typeface="+mn-cs"/>
       </a:defRPr>
     </a:lvl2pPr>
-    <a:lvl3pPr marL="914400" algn="l" defTabSz="914400" rtl="0" eaLnBrk="1" latinLnBrk="0" hangingPunct="1">
+    <a:lvl3pPr marL="914400" algn="l" defTabSz="457200" rtl="0" eaLnBrk="1" latinLnBrk="0" hangingPunct="1">
       <a:defRPr sz="1800" kern="1200">
         <a:solidFill>
           <a:schemeClr val="tx1"/>
@@ -48,7 +51,7 @@
         <a:cs typeface="+mn-cs"/>
       </a:defRPr>
     </a:lvl3pPr>
-    <a:lvl4pPr marL="1371600" algn="l" defTabSz="914400" rtl="0" eaLnBrk="1" latinLnBrk="0" hangingPunct="1">
+    <a:lvl4pPr marL="1371600" algn="l" defTabSz="457200" rtl="0" eaLnBrk="1" latinLnBrk="0" hangingPunct="1">
       <a:defRPr sz="1800" kern="1200">
         <a:solidFill>
           <a:schemeClr val="tx1"/>
@@ -58,7 +61,7 @@
         <a:cs typeface="+mn-cs"/>
       </a:defRPr>
     </a:lvl4pPr>
-    <a:lvl5pPr marL="1828800" algn="l" defTabSz="914400" rtl="0" eaLnBrk="1" latinLnBrk="0" hangingPunct="1">
+    <a:lvl5pPr marL="1828800" algn="l" defTabSz="457200" rtl="0" eaLnBrk="1" latinLnBrk="0" hangingPunct="1">
       <a:defRPr sz="1800" kern="1200">
         <a:solidFill>
           <a:schemeClr val="tx1"/>
@@ -68,7 +71,7 @@
         <a:cs typeface="+mn-cs"/>
       </a:defRPr>
     </a:lvl5pPr>
-    <a:lvl6pPr marL="2286000" algn="l" defTabSz="914400" rtl="0" eaLnBrk="1" latinLnBrk="0" hangingPunct="1">
+    <a:lvl6pPr marL="2286000" algn="l" defTabSz="457200" rtl="0" eaLnBrk="1" latinLnBrk="0" hangingPunct="1">
       <a:defRPr sz="1800" kern="1200">
         <a:solidFill>
           <a:schemeClr val="tx1"/>
@@ -78,7 +81,7 @@
         <a:cs typeface="+mn-cs"/>
       </a:defRPr>
     </a:lvl6pPr>
-    <a:lvl7pPr marL="2743200" algn="l" defTabSz="914400" rtl="0" eaLnBrk="1" latinLnBrk="0" hangingPunct="1">
+    <a:lvl7pPr marL="2743200" algn="l" defTabSz="457200" rtl="0" eaLnBrk="1" latinLnBrk="0" hangingPunct="1">
       <a:defRPr sz="1800" kern="1200">
         <a:solidFill>
           <a:schemeClr val="tx1"/>
@@ -88,7 +91,7 @@
         <a:cs typeface="+mn-cs"/>
       </a:defRPr>
     </a:lvl7pPr>
-    <a:lvl8pPr marL="3200400" algn="l" defTabSz="914400" rtl="0" eaLnBrk="1" latinLnBrk="0" hangingPunct="1">
+    <a:lvl8pPr marL="3200400" algn="l" defTabSz="457200" rtl="0" eaLnBrk="1" latinLnBrk="0" hangingPunct="1">
       <a:defRPr sz="1800" kern="1200">
         <a:solidFill>
           <a:schemeClr val="tx1"/>
@@ -98,7 +101,7 @@
         <a:cs typeface="+mn-cs"/>
       </a:defRPr>
     </a:lvl8pPr>
-    <a:lvl9pPr marL="3657600" algn="l" defTabSz="914400" rtl="0" eaLnBrk="1" latinLnBrk="0" hangingPunct="1">
+    <a:lvl9pPr marL="3657600" algn="l" defTabSz="457200" rtl="0" eaLnBrk="1" latinLnBrk="0" hangingPunct="1">
       <a:defRPr sz="1800" kern="1200">
         <a:solidFill>
           <a:schemeClr val="tx1"/>
@@ -109,7 +112,362 @@
       </a:defRPr>
     </a:lvl9pPr>
   </p:defaultTextStyle>
+  <p:extLst>
+    <p:ext uri="{EFAFB233-063F-42B5-8137-9DF3F51BA10A}">
+      <p15:sldGuideLst xmlns:p15="http://schemas.microsoft.com/office/powerpoint/2012/main"/>
+    </p:ext>
+  </p:extLst>
 </p:presentation>
+</file>
+
+<file path=ppt/notesMasters/notesMaster1.xml><?xml version="1.0" encoding="utf-8"?>
+<p:notesMaster xmlns:a="http://schemas.openxmlformats.org/drawingml/2006/main" xmlns:r="http://schemas.openxmlformats.org/officeDocument/2006/relationships" xmlns:p="http://schemas.openxmlformats.org/presentationml/2006/main">
+  <p:cSld>
+    <p:bg>
+      <p:bgRef idx="1001">
+        <a:schemeClr val="bg1"/>
+      </p:bgRef>
+    </p:bg>
+    <p:spTree>
+      <p:nvGrpSpPr>
+        <p:cNvPr id="1" name=""/>
+        <p:cNvGrpSpPr/>
+        <p:nvPr/>
+      </p:nvGrpSpPr>
+      <p:grpSpPr>
+        <a:xfrm>
+          <a:off x="0" y="0"/>
+          <a:ext cx="0" cy="0"/>
+          <a:chOff x="0" y="0"/>
+          <a:chExt cx="0" cy="0"/>
+        </a:xfrm>
+      </p:grpSpPr>
+      <p:sp>
+        <p:nvSpPr>
+          <p:cNvPr id="2" name="Header Placeholder 1"/>
+          <p:cNvSpPr>
+            <a:spLocks noGrp="1"/>
+          </p:cNvSpPr>
+          <p:nvPr>
+            <p:ph type="hdr" sz="quarter"/>
+          </p:nvPr>
+        </p:nvSpPr>
+        <p:spPr>
+          <a:xfrm>
+            <a:off x="0" y="0"/>
+            <a:ext cx="2971800" cy="458788"/>
+          </a:xfrm>
+          <a:prstGeom prst="rect">
+            <a:avLst/>
+          </a:prstGeom>
+        </p:spPr>
+        <p:txBody>
+          <a:bodyPr vert="horz" lIns="91440" tIns="45720" rIns="91440" bIns="45720" rtlCol="0"/>
+          <a:lstStyle>
+            <a:lvl1pPr algn="l">
+              <a:defRPr sz="1200"/>
+            </a:lvl1pPr>
+          </a:lstStyle>
+          <a:p>
+            <a:endParaRPr lang="en-US"/>
+          </a:p>
+        </p:txBody>
+      </p:sp>
+      <p:sp>
+        <p:nvSpPr>
+          <p:cNvPr id="3" name="Date Placeholder 2"/>
+          <p:cNvSpPr>
+            <a:spLocks noGrp="1"/>
+          </p:cNvSpPr>
+          <p:nvPr>
+            <p:ph type="dt" idx="1"/>
+          </p:nvPr>
+        </p:nvSpPr>
+        <p:spPr>
+          <a:xfrm>
+            <a:off x="3884613" y="0"/>
+            <a:ext cx="2971800" cy="458788"/>
+          </a:xfrm>
+          <a:prstGeom prst="rect">
+            <a:avLst/>
+          </a:prstGeom>
+        </p:spPr>
+        <p:txBody>
+          <a:bodyPr vert="horz" lIns="91440" tIns="45720" rIns="91440" bIns="45720" rtlCol="0"/>
+          <a:lstStyle>
+            <a:lvl1pPr algn="r">
+              <a:defRPr sz="1200"/>
+            </a:lvl1pPr>
+          </a:lstStyle>
+          <a:p>
+            <a:fld id="{BEC2CF56-0D9A-4BDC-BD7D-88B48478D9E2}" type="datetimeFigureOut">
+              <a:rPr lang="en-US" smtClean="0"/>
+              <a:t>10/23/2017</a:t>
+            </a:fld>
+            <a:endParaRPr lang="en-US"/>
+          </a:p>
+        </p:txBody>
+      </p:sp>
+      <p:sp>
+        <p:nvSpPr>
+          <p:cNvPr id="4" name="Slide Image Placeholder 3"/>
+          <p:cNvSpPr>
+            <a:spLocks noGrp="1" noRot="1" noChangeAspect="1"/>
+          </p:cNvSpPr>
+          <p:nvPr>
+            <p:ph type="sldImg" idx="2"/>
+          </p:nvPr>
+        </p:nvSpPr>
+        <p:spPr>
+          <a:xfrm>
+            <a:off x="685800" y="1143000"/>
+            <a:ext cx="5486400" cy="3086100"/>
+          </a:xfrm>
+          <a:prstGeom prst="rect">
+            <a:avLst/>
+          </a:prstGeom>
+          <a:noFill/>
+          <a:ln w="12700">
+            <a:solidFill>
+              <a:prstClr val="black"/>
+            </a:solidFill>
+          </a:ln>
+        </p:spPr>
+        <p:txBody>
+          <a:bodyPr vert="horz" lIns="91440" tIns="45720" rIns="91440" bIns="45720" rtlCol="0" anchor="ctr"/>
+          <a:lstStyle/>
+          <a:p>
+            <a:endParaRPr lang="en-US"/>
+          </a:p>
+        </p:txBody>
+      </p:sp>
+      <p:sp>
+        <p:nvSpPr>
+          <p:cNvPr id="5" name="Notes Placeholder 4"/>
+          <p:cNvSpPr>
+            <a:spLocks noGrp="1"/>
+          </p:cNvSpPr>
+          <p:nvPr>
+            <p:ph type="body" sz="quarter" idx="3"/>
+          </p:nvPr>
+        </p:nvSpPr>
+        <p:spPr>
+          <a:xfrm>
+            <a:off x="685800" y="4400550"/>
+            <a:ext cx="5486400" cy="3600450"/>
+          </a:xfrm>
+          <a:prstGeom prst="rect">
+            <a:avLst/>
+          </a:prstGeom>
+        </p:spPr>
+        <p:txBody>
+          <a:bodyPr vert="horz" lIns="91440" tIns="45720" rIns="91440" bIns="45720" rtlCol="0"/>
+          <a:lstStyle/>
+          <a:p>
+            <a:pPr lvl="0"/>
+            <a:r>
+              <a:rPr lang="en-US" smtClean="0"/>
+              <a:t>Edit Master text styles</a:t>
+            </a:r>
+          </a:p>
+          <a:p>
+            <a:pPr lvl="1"/>
+            <a:r>
+              <a:rPr lang="en-US" smtClean="0"/>
+              <a:t>Second level</a:t>
+            </a:r>
+          </a:p>
+          <a:p>
+            <a:pPr lvl="2"/>
+            <a:r>
+              <a:rPr lang="en-US" smtClean="0"/>
+              <a:t>Third level</a:t>
+            </a:r>
+          </a:p>
+          <a:p>
+            <a:pPr lvl="3"/>
+            <a:r>
+              <a:rPr lang="en-US" smtClean="0"/>
+              <a:t>Fourth level</a:t>
+            </a:r>
+          </a:p>
+          <a:p>
+            <a:pPr lvl="4"/>
+            <a:r>
+              <a:rPr lang="en-US" smtClean="0"/>
+              <a:t>Fifth level</a:t>
+            </a:r>
+            <a:endParaRPr lang="en-US"/>
+          </a:p>
+        </p:txBody>
+      </p:sp>
+      <p:sp>
+        <p:nvSpPr>
+          <p:cNvPr id="6" name="Footer Placeholder 5"/>
+          <p:cNvSpPr>
+            <a:spLocks noGrp="1"/>
+          </p:cNvSpPr>
+          <p:nvPr>
+            <p:ph type="ftr" sz="quarter" idx="4"/>
+          </p:nvPr>
+        </p:nvSpPr>
+        <p:spPr>
+          <a:xfrm>
+            <a:off x="0" y="8685213"/>
+            <a:ext cx="2971800" cy="458787"/>
+          </a:xfrm>
+          <a:prstGeom prst="rect">
+            <a:avLst/>
+          </a:prstGeom>
+        </p:spPr>
+        <p:txBody>
+          <a:bodyPr vert="horz" lIns="91440" tIns="45720" rIns="91440" bIns="45720" rtlCol="0" anchor="b"/>
+          <a:lstStyle>
+            <a:lvl1pPr algn="l">
+              <a:defRPr sz="1200"/>
+            </a:lvl1pPr>
+          </a:lstStyle>
+          <a:p>
+            <a:endParaRPr lang="en-US"/>
+          </a:p>
+        </p:txBody>
+      </p:sp>
+      <p:sp>
+        <p:nvSpPr>
+          <p:cNvPr id="7" name="Slide Number Placeholder 6"/>
+          <p:cNvSpPr>
+            <a:spLocks noGrp="1"/>
+          </p:cNvSpPr>
+          <p:nvPr>
+            <p:ph type="sldNum" sz="quarter" idx="5"/>
+          </p:nvPr>
+        </p:nvSpPr>
+        <p:spPr>
+          <a:xfrm>
+            <a:off x="3884613" y="8685213"/>
+            <a:ext cx="2971800" cy="458787"/>
+          </a:xfrm>
+          <a:prstGeom prst="rect">
+            <a:avLst/>
+          </a:prstGeom>
+        </p:spPr>
+        <p:txBody>
+          <a:bodyPr vert="horz" lIns="91440" tIns="45720" rIns="91440" bIns="45720" rtlCol="0" anchor="b"/>
+          <a:lstStyle>
+            <a:lvl1pPr algn="r">
+              <a:defRPr sz="1200"/>
+            </a:lvl1pPr>
+          </a:lstStyle>
+          <a:p>
+            <a:fld id="{99985B37-2A5F-4415-B49F-96E51268DD37}" type="slidenum">
+              <a:rPr lang="en-US" smtClean="0"/>
+              <a:t>‹#›</a:t>
+            </a:fld>
+            <a:endParaRPr lang="en-US"/>
+          </a:p>
+        </p:txBody>
+      </p:sp>
+    </p:spTree>
+    <p:extLst>
+      <p:ext uri="{BB962C8B-B14F-4D97-AF65-F5344CB8AC3E}">
+        <p14:creationId xmlns:p14="http://schemas.microsoft.com/office/powerpoint/2010/main" val="363882197"/>
+      </p:ext>
+    </p:extLst>
+  </p:cSld>
+  <p:clrMap bg1="lt1" tx1="dk1" bg2="lt2" tx2="dk2" accent1="accent1" accent2="accent2" accent3="accent3" accent4="accent4" accent5="accent5" accent6="accent6" hlink="hlink" folHlink="folHlink"/>
+  <p:notesStyle>
+    <a:lvl1pPr marL="0" algn="l" defTabSz="914400" rtl="0" eaLnBrk="1" latinLnBrk="0" hangingPunct="1">
+      <a:defRPr sz="1200" kern="1200">
+        <a:solidFill>
+          <a:schemeClr val="tx1"/>
+        </a:solidFill>
+        <a:latin typeface="+mn-lt"/>
+        <a:ea typeface="+mn-ea"/>
+        <a:cs typeface="+mn-cs"/>
+      </a:defRPr>
+    </a:lvl1pPr>
+    <a:lvl2pPr marL="457200" algn="l" defTabSz="914400" rtl="0" eaLnBrk="1" latinLnBrk="0" hangingPunct="1">
+      <a:defRPr sz="1200" kern="1200">
+        <a:solidFill>
+          <a:schemeClr val="tx1"/>
+        </a:solidFill>
+        <a:latin typeface="+mn-lt"/>
+        <a:ea typeface="+mn-ea"/>
+        <a:cs typeface="+mn-cs"/>
+      </a:defRPr>
+    </a:lvl2pPr>
+    <a:lvl3pPr marL="914400" algn="l" defTabSz="914400" rtl="0" eaLnBrk="1" latinLnBrk="0" hangingPunct="1">
+      <a:defRPr sz="1200" kern="1200">
+        <a:solidFill>
+          <a:schemeClr val="tx1"/>
+        </a:solidFill>
+        <a:latin typeface="+mn-lt"/>
+        <a:ea typeface="+mn-ea"/>
+        <a:cs typeface="+mn-cs"/>
+      </a:defRPr>
+    </a:lvl3pPr>
+    <a:lvl4pPr marL="1371600" algn="l" defTabSz="914400" rtl="0" eaLnBrk="1" latinLnBrk="0" hangingPunct="1">
+      <a:defRPr sz="1200" kern="1200">
+        <a:solidFill>
+          <a:schemeClr val="tx1"/>
+        </a:solidFill>
+        <a:latin typeface="+mn-lt"/>
+        <a:ea typeface="+mn-ea"/>
+        <a:cs typeface="+mn-cs"/>
+      </a:defRPr>
+    </a:lvl4pPr>
+    <a:lvl5pPr marL="1828800" algn="l" defTabSz="914400" rtl="0" eaLnBrk="1" latinLnBrk="0" hangingPunct="1">
+      <a:defRPr sz="1200" kern="1200">
+        <a:solidFill>
+          <a:schemeClr val="tx1"/>
+        </a:solidFill>
+        <a:latin typeface="+mn-lt"/>
+        <a:ea typeface="+mn-ea"/>
+        <a:cs typeface="+mn-cs"/>
+      </a:defRPr>
+    </a:lvl5pPr>
+    <a:lvl6pPr marL="2286000" algn="l" defTabSz="914400" rtl="0" eaLnBrk="1" latinLnBrk="0" hangingPunct="1">
+      <a:defRPr sz="1200" kern="1200">
+        <a:solidFill>
+          <a:schemeClr val="tx1"/>
+        </a:solidFill>
+        <a:latin typeface="+mn-lt"/>
+        <a:ea typeface="+mn-ea"/>
+        <a:cs typeface="+mn-cs"/>
+      </a:defRPr>
+    </a:lvl6pPr>
+    <a:lvl7pPr marL="2743200" algn="l" defTabSz="914400" rtl="0" eaLnBrk="1" latinLnBrk="0" hangingPunct="1">
+      <a:defRPr sz="1200" kern="1200">
+        <a:solidFill>
+          <a:schemeClr val="tx1"/>
+        </a:solidFill>
+        <a:latin typeface="+mn-lt"/>
+        <a:ea typeface="+mn-ea"/>
+        <a:cs typeface="+mn-cs"/>
+      </a:defRPr>
+    </a:lvl7pPr>
+    <a:lvl8pPr marL="3200400" algn="l" defTabSz="914400" rtl="0" eaLnBrk="1" latinLnBrk="0" hangingPunct="1">
+      <a:defRPr sz="1200" kern="1200">
+        <a:solidFill>
+          <a:schemeClr val="tx1"/>
+        </a:solidFill>
+        <a:latin typeface="+mn-lt"/>
+        <a:ea typeface="+mn-ea"/>
+        <a:cs typeface="+mn-cs"/>
+      </a:defRPr>
+    </a:lvl8pPr>
+    <a:lvl9pPr marL="3657600" algn="l" defTabSz="914400" rtl="0" eaLnBrk="1" latinLnBrk="0" hangingPunct="1">
+      <a:defRPr sz="1200" kern="1200">
+        <a:solidFill>
+          <a:schemeClr val="tx1"/>
+        </a:solidFill>
+        <a:latin typeface="+mn-lt"/>
+        <a:ea typeface="+mn-ea"/>
+        <a:cs typeface="+mn-cs"/>
+      </a:defRPr>
+    </a:lvl9pPr>
+  </p:notesStyle>
+</p:notesMaster>
 </file>
 
 <file path=ppt/slideLayouts/slideLayout1.xml><?xml version="1.0" encoding="utf-8"?>
@@ -129,6 +487,36 @@
           <a:chExt cx="0" cy="0"/>
         </a:xfrm>
       </p:grpSpPr>
+      <p:pic>
+        <p:nvPicPr>
+          <p:cNvPr id="7" name="Picture 6" descr="C0-HD-BTM.png"/>
+          <p:cNvPicPr>
+            <a:picLocks noChangeAspect="1"/>
+          </p:cNvPicPr>
+          <p:nvPr/>
+        </p:nvPicPr>
+        <p:blipFill>
+          <a:blip r:embed="rId2">
+            <a:extLst>
+              <a:ext uri="{28A0092B-C50C-407E-A947-70E740481C1C}">
+                <a14:useLocalDpi xmlns:a14="http://schemas.microsoft.com/office/drawing/2010/main" val="0"/>
+              </a:ext>
+            </a:extLst>
+          </a:blip>
+          <a:stretch>
+            <a:fillRect/>
+          </a:stretch>
+        </p:blipFill>
+        <p:spPr>
+          <a:xfrm>
+            <a:off x="0" y="4375150"/>
+            <a:ext cx="12192000" cy="2482850"/>
+          </a:xfrm>
+          <a:prstGeom prst="rect">
+            <a:avLst/>
+          </a:prstGeom>
+        </p:spPr>
+      </p:pic>
       <p:sp>
         <p:nvSpPr>
           <p:cNvPr id="2" name="Title 1"/>
@@ -141,14 +529,16 @@
         </p:nvSpPr>
         <p:spPr>
           <a:xfrm>
-            <a:off x="1524000" y="1122363"/>
-            <a:ext cx="9144000" cy="2387600"/>
-          </a:xfrm>
-        </p:spPr>
-        <p:txBody>
-          <a:bodyPr anchor="b"/>
+            <a:off x="1371600" y="1803405"/>
+            <a:ext cx="9448800" cy="1825096"/>
+          </a:xfrm>
+        </p:spPr>
+        <p:txBody>
+          <a:bodyPr anchor="b">
+            <a:normAutofit/>
+          </a:bodyPr>
           <a:lstStyle>
-            <a:lvl1pPr algn="ctr">
+            <a:lvl1pPr algn="l">
               <a:defRPr sz="6000"/>
             </a:lvl1pPr>
           </a:lstStyle>
@@ -157,7 +547,7 @@
               <a:rPr lang="en-US" smtClean="0"/>
               <a:t>Click to edit Master title style</a:t>
             </a:r>
-            <a:endParaRPr lang="en-US"/>
+            <a:endParaRPr lang="en-US" dirty="0"/>
           </a:p>
         </p:txBody>
       </p:sp>
@@ -173,16 +563,18 @@
         </p:nvSpPr>
         <p:spPr>
           <a:xfrm>
-            <a:off x="1524000" y="3602038"/>
-            <a:ext cx="9144000" cy="1655762"/>
-          </a:xfrm>
-        </p:spPr>
-        <p:txBody>
-          <a:bodyPr/>
+            <a:off x="1371600" y="3632201"/>
+            <a:ext cx="9448800" cy="685800"/>
+          </a:xfrm>
+        </p:spPr>
+        <p:txBody>
+          <a:bodyPr>
+            <a:normAutofit/>
+          </a:bodyPr>
           <a:lstStyle>
-            <a:lvl1pPr marL="0" indent="0" algn="ctr">
-              <a:buNone/>
-              <a:defRPr sz="2400"/>
+            <a:lvl1pPr marL="0" indent="0" algn="l">
+              <a:buNone/>
+              <a:defRPr sz="2000"/>
             </a:lvl1pPr>
             <a:lvl2pPr marL="457200" indent="0" algn="ctr">
               <a:buNone/>
@@ -222,7 +614,7 @@
               <a:rPr lang="en-US" smtClean="0"/>
               <a:t>Click to edit Master subtitle style</a:t>
             </a:r>
-            <a:endParaRPr lang="en-US"/>
+            <a:endParaRPr lang="en-US" dirty="0"/>
           </a:p>
         </p:txBody>
       </p:sp>
@@ -236,12 +628,17 @@
             <p:ph type="dt" sz="half" idx="10"/>
           </p:nvPr>
         </p:nvSpPr>
-        <p:spPr/>
-        <p:txBody>
-          <a:bodyPr/>
-          <a:lstStyle/>
-          <a:p>
-            <a:fld id="{822E1C28-B949-4155-BDD8-86A4AEEBA49D}" type="datetimeFigureOut">
+        <p:spPr>
+          <a:xfrm>
+            <a:off x="7909561" y="4314328"/>
+            <a:ext cx="2910840" cy="374642"/>
+          </a:xfrm>
+        </p:spPr>
+        <p:txBody>
+          <a:bodyPr/>
+          <a:lstStyle/>
+          <a:p>
+            <a:fld id="{755DFC52-97FD-443C-B030-BE83941CE4DC}" type="datetime1">
               <a:rPr lang="en-US" smtClean="0"/>
               <a:t>10/23/2017</a:t>
             </a:fld>
@@ -259,7 +656,12 @@
             <p:ph type="ftr" sz="quarter" idx="11"/>
           </p:nvPr>
         </p:nvSpPr>
-        <p:spPr/>
+        <p:spPr>
+          <a:xfrm>
+            <a:off x="1371600" y="4323845"/>
+            <a:ext cx="6400800" cy="365125"/>
+          </a:xfrm>
+        </p:spPr>
         <p:txBody>
           <a:bodyPr/>
           <a:lstStyle/>
@@ -278,7 +680,12 @@
             <p:ph type="sldNum" sz="quarter" idx="12"/>
           </p:nvPr>
         </p:nvSpPr>
-        <p:spPr/>
+        <p:spPr>
+          <a:xfrm>
+            <a:off x="8077200" y="1430866"/>
+            <a:ext cx="2743200" cy="365125"/>
+          </a:xfrm>
+        </p:spPr>
         <p:txBody>
           <a:bodyPr/>
           <a:lstStyle/>
@@ -294,7 +701,7 @@
     </p:spTree>
     <p:extLst>
       <p:ext uri="{BB962C8B-B14F-4D97-AF65-F5344CB8AC3E}">
-        <p14:creationId xmlns:p14="http://schemas.microsoft.com/office/powerpoint/2010/main" val="3383032153"/>
+        <p14:creationId xmlns:p14="http://schemas.microsoft.com/office/powerpoint/2010/main" val="2297495769"/>
       </p:ext>
     </p:extLst>
   </p:cSld>
@@ -305,6 +712,2598 @@
 </file>
 
 <file path=ppt/slideLayouts/slideLayout10.xml><?xml version="1.0" encoding="utf-8"?>
+<p:sldLayout xmlns:a="http://schemas.openxmlformats.org/drawingml/2006/main" xmlns:r="http://schemas.openxmlformats.org/officeDocument/2006/relationships" xmlns:p="http://schemas.openxmlformats.org/presentationml/2006/main" preserve="1">
+  <p:cSld name="Panoramic Picture with Caption">
+    <p:spTree>
+      <p:nvGrpSpPr>
+        <p:cNvPr id="1" name=""/>
+        <p:cNvGrpSpPr/>
+        <p:nvPr/>
+      </p:nvGrpSpPr>
+      <p:grpSpPr>
+        <a:xfrm>
+          <a:off x="0" y="0"/>
+          <a:ext cx="0" cy="0"/>
+          <a:chOff x="0" y="0"/>
+          <a:chExt cx="0" cy="0"/>
+        </a:xfrm>
+      </p:grpSpPr>
+      <p:sp>
+        <p:nvSpPr>
+          <p:cNvPr id="2" name="Title 1"/>
+          <p:cNvSpPr>
+            <a:spLocks noGrp="1"/>
+          </p:cNvSpPr>
+          <p:nvPr>
+            <p:ph type="title"/>
+          </p:nvPr>
+        </p:nvSpPr>
+        <p:spPr>
+          <a:xfrm>
+            <a:off x="685777" y="4697360"/>
+            <a:ext cx="10822034" cy="819355"/>
+          </a:xfrm>
+        </p:spPr>
+        <p:txBody>
+          <a:bodyPr anchor="b"/>
+          <a:lstStyle>
+            <a:lvl1pPr algn="l">
+              <a:defRPr sz="3200"/>
+            </a:lvl1pPr>
+          </a:lstStyle>
+          <a:p>
+            <a:r>
+              <a:rPr lang="en-US" smtClean="0"/>
+              <a:t>Click to edit Master title style</a:t>
+            </a:r>
+            <a:endParaRPr lang="en-US" dirty="0"/>
+          </a:p>
+        </p:txBody>
+      </p:sp>
+      <p:sp>
+        <p:nvSpPr>
+          <p:cNvPr id="3" name="Picture Placeholder 2"/>
+          <p:cNvSpPr>
+            <a:spLocks noGrp="1" noChangeAspect="1"/>
+          </p:cNvSpPr>
+          <p:nvPr>
+            <p:ph type="pic" idx="1"/>
+          </p:nvPr>
+        </p:nvSpPr>
+        <p:spPr>
+          <a:xfrm>
+            <a:off x="681727" y="941439"/>
+            <a:ext cx="10821840" cy="3478161"/>
+          </a:xfrm>
+        </p:spPr>
+        <p:txBody>
+          <a:bodyPr anchor="t"/>
+          <a:lstStyle>
+            <a:lvl1pPr marL="0" indent="0">
+              <a:buNone/>
+              <a:defRPr sz="3200"/>
+            </a:lvl1pPr>
+            <a:lvl2pPr marL="457200" indent="0">
+              <a:buNone/>
+              <a:defRPr sz="2800"/>
+            </a:lvl2pPr>
+            <a:lvl3pPr marL="914400" indent="0">
+              <a:buNone/>
+              <a:defRPr sz="2400"/>
+            </a:lvl3pPr>
+            <a:lvl4pPr marL="1371600" indent="0">
+              <a:buNone/>
+              <a:defRPr sz="2000"/>
+            </a:lvl4pPr>
+            <a:lvl5pPr marL="1828800" indent="0">
+              <a:buNone/>
+              <a:defRPr sz="2000"/>
+            </a:lvl5pPr>
+            <a:lvl6pPr marL="2286000" indent="0">
+              <a:buNone/>
+              <a:defRPr sz="2000"/>
+            </a:lvl6pPr>
+            <a:lvl7pPr marL="2743200" indent="0">
+              <a:buNone/>
+              <a:defRPr sz="2000"/>
+            </a:lvl7pPr>
+            <a:lvl8pPr marL="3200400" indent="0">
+              <a:buNone/>
+              <a:defRPr sz="2000"/>
+            </a:lvl8pPr>
+            <a:lvl9pPr marL="3657600" indent="0">
+              <a:buNone/>
+              <a:defRPr sz="2000"/>
+            </a:lvl9pPr>
+          </a:lstStyle>
+          <a:p>
+            <a:r>
+              <a:rPr lang="en-US" smtClean="0"/>
+              <a:t>Click icon to add picture</a:t>
+            </a:r>
+            <a:endParaRPr lang="en-US" dirty="0"/>
+          </a:p>
+        </p:txBody>
+      </p:sp>
+      <p:sp>
+        <p:nvSpPr>
+          <p:cNvPr id="4" name="Text Placeholder 3"/>
+          <p:cNvSpPr>
+            <a:spLocks noGrp="1"/>
+          </p:cNvSpPr>
+          <p:nvPr>
+            <p:ph type="body" sz="half" idx="2"/>
+          </p:nvPr>
+        </p:nvSpPr>
+        <p:spPr>
+          <a:xfrm>
+            <a:off x="685800" y="5516715"/>
+            <a:ext cx="10820400" cy="701969"/>
+          </a:xfrm>
+        </p:spPr>
+        <p:txBody>
+          <a:bodyPr/>
+          <a:lstStyle>
+            <a:lvl1pPr marL="0" indent="0" algn="l">
+              <a:buNone/>
+              <a:defRPr sz="1600"/>
+            </a:lvl1pPr>
+            <a:lvl2pPr marL="457200" indent="0">
+              <a:buNone/>
+              <a:defRPr sz="1400"/>
+            </a:lvl2pPr>
+            <a:lvl3pPr marL="914400" indent="0">
+              <a:buNone/>
+              <a:defRPr sz="1200"/>
+            </a:lvl3pPr>
+            <a:lvl4pPr marL="1371600" indent="0">
+              <a:buNone/>
+              <a:defRPr sz="1000"/>
+            </a:lvl4pPr>
+            <a:lvl5pPr marL="1828800" indent="0">
+              <a:buNone/>
+              <a:defRPr sz="1000"/>
+            </a:lvl5pPr>
+            <a:lvl6pPr marL="2286000" indent="0">
+              <a:buNone/>
+              <a:defRPr sz="1000"/>
+            </a:lvl6pPr>
+            <a:lvl7pPr marL="2743200" indent="0">
+              <a:buNone/>
+              <a:defRPr sz="1000"/>
+            </a:lvl7pPr>
+            <a:lvl8pPr marL="3200400" indent="0">
+              <a:buNone/>
+              <a:defRPr sz="1000"/>
+            </a:lvl8pPr>
+            <a:lvl9pPr marL="3657600" indent="0">
+              <a:buNone/>
+              <a:defRPr sz="1000"/>
+            </a:lvl9pPr>
+          </a:lstStyle>
+          <a:p>
+            <a:pPr lvl="0"/>
+            <a:r>
+              <a:rPr lang="en-US" smtClean="0"/>
+              <a:t>Edit Master text styles</a:t>
+            </a:r>
+          </a:p>
+        </p:txBody>
+      </p:sp>
+      <p:sp>
+        <p:nvSpPr>
+          <p:cNvPr id="5" name="Date Placeholder 4"/>
+          <p:cNvSpPr>
+            <a:spLocks noGrp="1"/>
+          </p:cNvSpPr>
+          <p:nvPr>
+            <p:ph type="dt" sz="half" idx="10"/>
+          </p:nvPr>
+        </p:nvSpPr>
+        <p:spPr/>
+        <p:txBody>
+          <a:bodyPr/>
+          <a:lstStyle/>
+          <a:p>
+            <a:fld id="{8344E5FB-D79A-4E21-83C0-73608AEFB066}" type="datetime1">
+              <a:rPr lang="en-US" smtClean="0"/>
+              <a:t>10/23/2017</a:t>
+            </a:fld>
+            <a:endParaRPr lang="en-US"/>
+          </a:p>
+        </p:txBody>
+      </p:sp>
+      <p:sp>
+        <p:nvSpPr>
+          <p:cNvPr id="6" name="Footer Placeholder 5"/>
+          <p:cNvSpPr>
+            <a:spLocks noGrp="1"/>
+          </p:cNvSpPr>
+          <p:nvPr>
+            <p:ph type="ftr" sz="quarter" idx="11"/>
+          </p:nvPr>
+        </p:nvSpPr>
+        <p:spPr/>
+        <p:txBody>
+          <a:bodyPr/>
+          <a:lstStyle/>
+          <a:p>
+            <a:endParaRPr lang="en-US"/>
+          </a:p>
+        </p:txBody>
+      </p:sp>
+      <p:sp>
+        <p:nvSpPr>
+          <p:cNvPr id="7" name="Slide Number Placeholder 6"/>
+          <p:cNvSpPr>
+            <a:spLocks noGrp="1"/>
+          </p:cNvSpPr>
+          <p:nvPr>
+            <p:ph type="sldNum" sz="quarter" idx="12"/>
+          </p:nvPr>
+        </p:nvSpPr>
+        <p:spPr/>
+        <p:txBody>
+          <a:bodyPr/>
+          <a:lstStyle/>
+          <a:p>
+            <a:fld id="{6DA7AA4B-8849-44DE-A3E8-A263F985E91B}" type="slidenum">
+              <a:rPr lang="en-US" smtClean="0"/>
+              <a:t>‹#›</a:t>
+            </a:fld>
+            <a:endParaRPr lang="en-US"/>
+          </a:p>
+        </p:txBody>
+      </p:sp>
+    </p:spTree>
+    <p:extLst>
+      <p:ext uri="{BB962C8B-B14F-4D97-AF65-F5344CB8AC3E}">
+        <p14:creationId xmlns:p14="http://schemas.microsoft.com/office/powerpoint/2010/main" val="3514505184"/>
+      </p:ext>
+    </p:extLst>
+  </p:cSld>
+  <p:clrMapOvr>
+    <a:masterClrMapping/>
+  </p:clrMapOvr>
+</p:sldLayout>
+</file>
+
+<file path=ppt/slideLayouts/slideLayout11.xml><?xml version="1.0" encoding="utf-8"?>
+<p:sldLayout xmlns:a="http://schemas.openxmlformats.org/drawingml/2006/main" xmlns:r="http://schemas.openxmlformats.org/officeDocument/2006/relationships" xmlns:p="http://schemas.openxmlformats.org/presentationml/2006/main" showMasterSp="0" preserve="1">
+  <p:cSld name="Title and Caption">
+    <p:spTree>
+      <p:nvGrpSpPr>
+        <p:cNvPr id="1" name=""/>
+        <p:cNvGrpSpPr/>
+        <p:nvPr/>
+      </p:nvGrpSpPr>
+      <p:grpSpPr>
+        <a:xfrm>
+          <a:off x="0" y="0"/>
+          <a:ext cx="0" cy="0"/>
+          <a:chOff x="0" y="0"/>
+          <a:chExt cx="0" cy="0"/>
+        </a:xfrm>
+      </p:grpSpPr>
+      <p:pic>
+        <p:nvPicPr>
+          <p:cNvPr id="8" name="Picture 7" descr="C0-HD-BTM.png"/>
+          <p:cNvPicPr>
+            <a:picLocks noChangeAspect="1"/>
+          </p:cNvPicPr>
+          <p:nvPr/>
+        </p:nvPicPr>
+        <p:blipFill>
+          <a:blip r:embed="rId2">
+            <a:extLst>
+              <a:ext uri="{28A0092B-C50C-407E-A947-70E740481C1C}">
+                <a14:useLocalDpi xmlns:a14="http://schemas.microsoft.com/office/drawing/2010/main" val="0"/>
+              </a:ext>
+            </a:extLst>
+          </a:blip>
+          <a:stretch>
+            <a:fillRect/>
+          </a:stretch>
+        </p:blipFill>
+        <p:spPr>
+          <a:xfrm>
+            <a:off x="0" y="4375150"/>
+            <a:ext cx="12192000" cy="2482850"/>
+          </a:xfrm>
+          <a:prstGeom prst="rect">
+            <a:avLst/>
+          </a:prstGeom>
+        </p:spPr>
+      </p:pic>
+      <p:sp>
+        <p:nvSpPr>
+          <p:cNvPr id="2" name="Title 1"/>
+          <p:cNvSpPr>
+            <a:spLocks noGrp="1"/>
+          </p:cNvSpPr>
+          <p:nvPr>
+            <p:ph type="title"/>
+          </p:nvPr>
+        </p:nvSpPr>
+        <p:spPr>
+          <a:xfrm>
+            <a:off x="685800" y="753532"/>
+            <a:ext cx="10820400" cy="2802467"/>
+          </a:xfrm>
+        </p:spPr>
+        <p:txBody>
+          <a:bodyPr anchor="ctr"/>
+          <a:lstStyle>
+            <a:lvl1pPr algn="l">
+              <a:defRPr sz="3200"/>
+            </a:lvl1pPr>
+          </a:lstStyle>
+          <a:p>
+            <a:r>
+              <a:rPr lang="en-US" smtClean="0"/>
+              <a:t>Click to edit Master title style</a:t>
+            </a:r>
+            <a:endParaRPr lang="en-US" dirty="0"/>
+          </a:p>
+        </p:txBody>
+      </p:sp>
+      <p:sp>
+        <p:nvSpPr>
+          <p:cNvPr id="4" name="Text Placeholder 3"/>
+          <p:cNvSpPr>
+            <a:spLocks noGrp="1"/>
+          </p:cNvSpPr>
+          <p:nvPr>
+            <p:ph type="body" sz="half" idx="2"/>
+          </p:nvPr>
+        </p:nvSpPr>
+        <p:spPr>
+          <a:xfrm>
+            <a:off x="1024467" y="3649133"/>
+            <a:ext cx="10130516" cy="999067"/>
+          </a:xfrm>
+        </p:spPr>
+        <p:txBody>
+          <a:bodyPr anchor="ctr"/>
+          <a:lstStyle>
+            <a:lvl1pPr marL="0" indent="0">
+              <a:buNone/>
+              <a:defRPr sz="1600"/>
+            </a:lvl1pPr>
+            <a:lvl2pPr marL="457200" indent="0">
+              <a:buNone/>
+              <a:defRPr sz="1400"/>
+            </a:lvl2pPr>
+            <a:lvl3pPr marL="914400" indent="0">
+              <a:buNone/>
+              <a:defRPr sz="1200"/>
+            </a:lvl3pPr>
+            <a:lvl4pPr marL="1371600" indent="0">
+              <a:buNone/>
+              <a:defRPr sz="1000"/>
+            </a:lvl4pPr>
+            <a:lvl5pPr marL="1828800" indent="0">
+              <a:buNone/>
+              <a:defRPr sz="1000"/>
+            </a:lvl5pPr>
+            <a:lvl6pPr marL="2286000" indent="0">
+              <a:buNone/>
+              <a:defRPr sz="1000"/>
+            </a:lvl6pPr>
+            <a:lvl7pPr marL="2743200" indent="0">
+              <a:buNone/>
+              <a:defRPr sz="1000"/>
+            </a:lvl7pPr>
+            <a:lvl8pPr marL="3200400" indent="0">
+              <a:buNone/>
+              <a:defRPr sz="1000"/>
+            </a:lvl8pPr>
+            <a:lvl9pPr marL="3657600" indent="0">
+              <a:buNone/>
+              <a:defRPr sz="1000"/>
+            </a:lvl9pPr>
+          </a:lstStyle>
+          <a:p>
+            <a:pPr lvl="0"/>
+            <a:r>
+              <a:rPr lang="en-US" smtClean="0"/>
+              <a:t>Edit Master text styles</a:t>
+            </a:r>
+          </a:p>
+        </p:txBody>
+      </p:sp>
+      <p:sp>
+        <p:nvSpPr>
+          <p:cNvPr id="5" name="Date Placeholder 4"/>
+          <p:cNvSpPr>
+            <a:spLocks noGrp="1"/>
+          </p:cNvSpPr>
+          <p:nvPr>
+            <p:ph type="dt" sz="half" idx="10"/>
+          </p:nvPr>
+        </p:nvSpPr>
+        <p:spPr>
+          <a:xfrm>
+            <a:off x="7814452" y="381000"/>
+            <a:ext cx="2910840" cy="365125"/>
+          </a:xfrm>
+        </p:spPr>
+        <p:txBody>
+          <a:bodyPr/>
+          <a:lstStyle>
+            <a:lvl1pPr algn="r">
+              <a:defRPr/>
+            </a:lvl1pPr>
+          </a:lstStyle>
+          <a:p>
+            <a:fld id="{6490ADD3-8A18-4936-AB5F-B89F2FB7B474}" type="datetime1">
+              <a:rPr lang="en-US" smtClean="0"/>
+              <a:t>10/23/2017</a:t>
+            </a:fld>
+            <a:endParaRPr lang="en-US"/>
+          </a:p>
+        </p:txBody>
+      </p:sp>
+      <p:sp>
+        <p:nvSpPr>
+          <p:cNvPr id="6" name="Footer Placeholder 5"/>
+          <p:cNvSpPr>
+            <a:spLocks noGrp="1"/>
+          </p:cNvSpPr>
+          <p:nvPr>
+            <p:ph type="ftr" sz="quarter" idx="11"/>
+          </p:nvPr>
+        </p:nvSpPr>
+        <p:spPr>
+          <a:xfrm>
+            <a:off x="685800" y="379941"/>
+            <a:ext cx="6991492" cy="365125"/>
+          </a:xfrm>
+        </p:spPr>
+        <p:txBody>
+          <a:bodyPr/>
+          <a:lstStyle/>
+          <a:p>
+            <a:endParaRPr lang="en-US"/>
+          </a:p>
+        </p:txBody>
+      </p:sp>
+      <p:sp>
+        <p:nvSpPr>
+          <p:cNvPr id="7" name="Slide Number Placeholder 6"/>
+          <p:cNvSpPr>
+            <a:spLocks noGrp="1"/>
+          </p:cNvSpPr>
+          <p:nvPr>
+            <p:ph type="sldNum" sz="quarter" idx="12"/>
+          </p:nvPr>
+        </p:nvSpPr>
+        <p:spPr>
+          <a:xfrm>
+            <a:off x="10862452" y="381000"/>
+            <a:ext cx="643748" cy="365125"/>
+          </a:xfrm>
+        </p:spPr>
+        <p:txBody>
+          <a:bodyPr/>
+          <a:lstStyle/>
+          <a:p>
+            <a:fld id="{6DA7AA4B-8849-44DE-A3E8-A263F985E91B}" type="slidenum">
+              <a:rPr lang="en-US" smtClean="0"/>
+              <a:t>‹#›</a:t>
+            </a:fld>
+            <a:endParaRPr lang="en-US"/>
+          </a:p>
+        </p:txBody>
+      </p:sp>
+    </p:spTree>
+    <p:extLst>
+      <p:ext uri="{BB962C8B-B14F-4D97-AF65-F5344CB8AC3E}">
+        <p14:creationId xmlns:p14="http://schemas.microsoft.com/office/powerpoint/2010/main" val="1135725545"/>
+      </p:ext>
+    </p:extLst>
+  </p:cSld>
+  <p:clrMapOvr>
+    <a:masterClrMapping/>
+  </p:clrMapOvr>
+</p:sldLayout>
+</file>
+
+<file path=ppt/slideLayouts/slideLayout12.xml><?xml version="1.0" encoding="utf-8"?>
+<p:sldLayout xmlns:a="http://schemas.openxmlformats.org/drawingml/2006/main" xmlns:r="http://schemas.openxmlformats.org/officeDocument/2006/relationships" xmlns:p="http://schemas.openxmlformats.org/presentationml/2006/main" showMasterSp="0" preserve="1">
+  <p:cSld name="Quote with Caption">
+    <p:spTree>
+      <p:nvGrpSpPr>
+        <p:cNvPr id="1" name=""/>
+        <p:cNvGrpSpPr/>
+        <p:nvPr/>
+      </p:nvGrpSpPr>
+      <p:grpSpPr>
+        <a:xfrm>
+          <a:off x="0" y="0"/>
+          <a:ext cx="0" cy="0"/>
+          <a:chOff x="0" y="0"/>
+          <a:chExt cx="0" cy="0"/>
+        </a:xfrm>
+      </p:grpSpPr>
+      <p:pic>
+        <p:nvPicPr>
+          <p:cNvPr id="13" name="Picture 12" descr="C0-HD-BTM.png"/>
+          <p:cNvPicPr>
+            <a:picLocks noChangeAspect="1"/>
+          </p:cNvPicPr>
+          <p:nvPr/>
+        </p:nvPicPr>
+        <p:blipFill>
+          <a:blip r:embed="rId2">
+            <a:extLst>
+              <a:ext uri="{28A0092B-C50C-407E-A947-70E740481C1C}">
+                <a14:useLocalDpi xmlns:a14="http://schemas.microsoft.com/office/drawing/2010/main" val="0"/>
+              </a:ext>
+            </a:extLst>
+          </a:blip>
+          <a:stretch>
+            <a:fillRect/>
+          </a:stretch>
+        </p:blipFill>
+        <p:spPr>
+          <a:xfrm>
+            <a:off x="0" y="4375150"/>
+            <a:ext cx="12192000" cy="2482850"/>
+          </a:xfrm>
+          <a:prstGeom prst="rect">
+            <a:avLst/>
+          </a:prstGeom>
+        </p:spPr>
+      </p:pic>
+      <p:sp>
+        <p:nvSpPr>
+          <p:cNvPr id="2" name="Title 1"/>
+          <p:cNvSpPr>
+            <a:spLocks noGrp="1"/>
+          </p:cNvSpPr>
+          <p:nvPr>
+            <p:ph type="title"/>
+          </p:nvPr>
+        </p:nvSpPr>
+        <p:spPr>
+          <a:xfrm>
+            <a:off x="1024467" y="753533"/>
+            <a:ext cx="10151533" cy="2604495"/>
+          </a:xfrm>
+        </p:spPr>
+        <p:txBody>
+          <a:bodyPr anchor="ctr"/>
+          <a:lstStyle>
+            <a:lvl1pPr algn="l">
+              <a:defRPr sz="3200"/>
+            </a:lvl1pPr>
+          </a:lstStyle>
+          <a:p>
+            <a:r>
+              <a:rPr lang="en-US" smtClean="0"/>
+              <a:t>Click to edit Master title style</a:t>
+            </a:r>
+            <a:endParaRPr lang="en-US" dirty="0"/>
+          </a:p>
+        </p:txBody>
+      </p:sp>
+      <p:sp>
+        <p:nvSpPr>
+          <p:cNvPr id="12" name="Text Placeholder 3"/>
+          <p:cNvSpPr>
+            <a:spLocks noGrp="1"/>
+          </p:cNvSpPr>
+          <p:nvPr>
+            <p:ph type="body" sz="half" idx="13"/>
+          </p:nvPr>
+        </p:nvSpPr>
+        <p:spPr>
+          <a:xfrm>
+            <a:off x="1303865" y="3365556"/>
+            <a:ext cx="9592736" cy="444443"/>
+          </a:xfrm>
+        </p:spPr>
+        <p:txBody>
+          <a:bodyPr anchor="t">
+            <a:normAutofit/>
+          </a:bodyPr>
+          <a:lstStyle>
+            <a:lvl1pPr marL="0" indent="0">
+              <a:buNone/>
+              <a:defRPr sz="1400"/>
+            </a:lvl1pPr>
+            <a:lvl2pPr marL="457200" indent="0">
+              <a:buNone/>
+              <a:defRPr sz="1400"/>
+            </a:lvl2pPr>
+            <a:lvl3pPr marL="914400" indent="0">
+              <a:buNone/>
+              <a:defRPr sz="1200"/>
+            </a:lvl3pPr>
+            <a:lvl4pPr marL="1371600" indent="0">
+              <a:buNone/>
+              <a:defRPr sz="1000"/>
+            </a:lvl4pPr>
+            <a:lvl5pPr marL="1828800" indent="0">
+              <a:buNone/>
+              <a:defRPr sz="1000"/>
+            </a:lvl5pPr>
+            <a:lvl6pPr marL="2286000" indent="0">
+              <a:buNone/>
+              <a:defRPr sz="1000"/>
+            </a:lvl6pPr>
+            <a:lvl7pPr marL="2743200" indent="0">
+              <a:buNone/>
+              <a:defRPr sz="1000"/>
+            </a:lvl7pPr>
+            <a:lvl8pPr marL="3200400" indent="0">
+              <a:buNone/>
+              <a:defRPr sz="1000"/>
+            </a:lvl8pPr>
+            <a:lvl9pPr marL="3657600" indent="0">
+              <a:buNone/>
+              <a:defRPr sz="1000"/>
+            </a:lvl9pPr>
+          </a:lstStyle>
+          <a:p>
+            <a:pPr lvl="0"/>
+            <a:r>
+              <a:rPr lang="en-US" smtClean="0"/>
+              <a:t>Edit Master text styles</a:t>
+            </a:r>
+          </a:p>
+        </p:txBody>
+      </p:sp>
+      <p:sp>
+        <p:nvSpPr>
+          <p:cNvPr id="4" name="Text Placeholder 3"/>
+          <p:cNvSpPr>
+            <a:spLocks noGrp="1"/>
+          </p:cNvSpPr>
+          <p:nvPr>
+            <p:ph type="body" sz="half" idx="2"/>
+          </p:nvPr>
+        </p:nvSpPr>
+        <p:spPr>
+          <a:xfrm>
+            <a:off x="1024467" y="3959862"/>
+            <a:ext cx="10151533" cy="679871"/>
+          </a:xfrm>
+        </p:spPr>
+        <p:txBody>
+          <a:bodyPr anchor="ctr">
+            <a:normAutofit/>
+          </a:bodyPr>
+          <a:lstStyle>
+            <a:lvl1pPr marL="0" indent="0">
+              <a:buNone/>
+              <a:defRPr sz="1600"/>
+            </a:lvl1pPr>
+            <a:lvl2pPr marL="457200" indent="0">
+              <a:buNone/>
+              <a:defRPr sz="1400"/>
+            </a:lvl2pPr>
+            <a:lvl3pPr marL="914400" indent="0">
+              <a:buNone/>
+              <a:defRPr sz="1200"/>
+            </a:lvl3pPr>
+            <a:lvl4pPr marL="1371600" indent="0">
+              <a:buNone/>
+              <a:defRPr sz="1000"/>
+            </a:lvl4pPr>
+            <a:lvl5pPr marL="1828800" indent="0">
+              <a:buNone/>
+              <a:defRPr sz="1000"/>
+            </a:lvl5pPr>
+            <a:lvl6pPr marL="2286000" indent="0">
+              <a:buNone/>
+              <a:defRPr sz="1000"/>
+            </a:lvl6pPr>
+            <a:lvl7pPr marL="2743200" indent="0">
+              <a:buNone/>
+              <a:defRPr sz="1000"/>
+            </a:lvl7pPr>
+            <a:lvl8pPr marL="3200400" indent="0">
+              <a:buNone/>
+              <a:defRPr sz="1000"/>
+            </a:lvl8pPr>
+            <a:lvl9pPr marL="3657600" indent="0">
+              <a:buNone/>
+              <a:defRPr sz="1000"/>
+            </a:lvl9pPr>
+          </a:lstStyle>
+          <a:p>
+            <a:pPr lvl="0"/>
+            <a:r>
+              <a:rPr lang="en-US" smtClean="0"/>
+              <a:t>Edit Master text styles</a:t>
+            </a:r>
+          </a:p>
+        </p:txBody>
+      </p:sp>
+      <p:sp>
+        <p:nvSpPr>
+          <p:cNvPr id="5" name="Date Placeholder 4"/>
+          <p:cNvSpPr>
+            <a:spLocks noGrp="1"/>
+          </p:cNvSpPr>
+          <p:nvPr>
+            <p:ph type="dt" sz="half" idx="10"/>
+          </p:nvPr>
+        </p:nvSpPr>
+        <p:spPr>
+          <a:xfrm>
+            <a:off x="7814452" y="381000"/>
+            <a:ext cx="2910840" cy="365125"/>
+          </a:xfrm>
+        </p:spPr>
+        <p:txBody>
+          <a:bodyPr/>
+          <a:lstStyle>
+            <a:lvl1pPr algn="r">
+              <a:defRPr/>
+            </a:lvl1pPr>
+          </a:lstStyle>
+          <a:p>
+            <a:fld id="{B61E6BBF-1712-44BC-AF8A-C8DCC4F4A75F}" type="datetime1">
+              <a:rPr lang="en-US" smtClean="0"/>
+              <a:t>10/23/2017</a:t>
+            </a:fld>
+            <a:endParaRPr lang="en-US"/>
+          </a:p>
+        </p:txBody>
+      </p:sp>
+      <p:sp>
+        <p:nvSpPr>
+          <p:cNvPr id="6" name="Footer Placeholder 5"/>
+          <p:cNvSpPr>
+            <a:spLocks noGrp="1"/>
+          </p:cNvSpPr>
+          <p:nvPr>
+            <p:ph type="ftr" sz="quarter" idx="11"/>
+          </p:nvPr>
+        </p:nvSpPr>
+        <p:spPr>
+          <a:xfrm>
+            <a:off x="685800" y="379941"/>
+            <a:ext cx="6991492" cy="365125"/>
+          </a:xfrm>
+        </p:spPr>
+        <p:txBody>
+          <a:bodyPr/>
+          <a:lstStyle/>
+          <a:p>
+            <a:endParaRPr lang="en-US"/>
+          </a:p>
+        </p:txBody>
+      </p:sp>
+      <p:sp>
+        <p:nvSpPr>
+          <p:cNvPr id="7" name="Slide Number Placeholder 6"/>
+          <p:cNvSpPr>
+            <a:spLocks noGrp="1"/>
+          </p:cNvSpPr>
+          <p:nvPr>
+            <p:ph type="sldNum" sz="quarter" idx="12"/>
+          </p:nvPr>
+        </p:nvSpPr>
+        <p:spPr>
+          <a:xfrm>
+            <a:off x="10862452" y="381000"/>
+            <a:ext cx="643748" cy="365125"/>
+          </a:xfrm>
+        </p:spPr>
+        <p:txBody>
+          <a:bodyPr/>
+          <a:lstStyle/>
+          <a:p>
+            <a:fld id="{6DA7AA4B-8849-44DE-A3E8-A263F985E91B}" type="slidenum">
+              <a:rPr lang="en-US" smtClean="0"/>
+              <a:t>‹#›</a:t>
+            </a:fld>
+            <a:endParaRPr lang="en-US"/>
+          </a:p>
+        </p:txBody>
+      </p:sp>
+      <p:sp>
+        <p:nvSpPr>
+          <p:cNvPr id="9" name="TextBox 8"/>
+          <p:cNvSpPr txBox="1"/>
+          <p:nvPr/>
+        </p:nvSpPr>
+        <p:spPr>
+          <a:xfrm>
+            <a:off x="476250" y="933450"/>
+            <a:ext cx="609600" cy="584776"/>
+          </a:xfrm>
+          <a:prstGeom prst="rect">
+            <a:avLst/>
+          </a:prstGeom>
+        </p:spPr>
+        <p:txBody>
+          <a:bodyPr vert="horz" lIns="91440" tIns="45720" rIns="91440" bIns="45720" rtlCol="0" anchor="ctr">
+            <a:noAutofit/>
+          </a:bodyPr>
+          <a:lstStyle>
+            <a:lvl1pPr>
+              <a:spcBef>
+                <a:spcPct val="0"/>
+              </a:spcBef>
+              <a:buNone/>
+              <a:defRPr sz="3200" b="0" cap="all">
+                <a:ln w="3175" cmpd="sng">
+                  <a:noFill/>
+                </a:ln>
+                <a:effectLst>
+                  <a:glow rad="38100">
+                    <a:schemeClr val="bg1">
+                      <a:lumMod val="65000"/>
+                      <a:lumOff val="35000"/>
+                      <a:alpha val="40000"/>
+                    </a:schemeClr>
+                  </a:glow>
+                  <a:outerShdw blurRad="28575" dist="38100" dir="14040000" algn="tl" rotWithShape="0">
+                    <a:srgbClr val="000000">
+                      <a:alpha val="25000"/>
+                    </a:srgbClr>
+                  </a:outerShdw>
+                </a:effectLst>
+              </a:defRPr>
+            </a:lvl1pPr>
+            <a:lvl2pPr>
+              <a:defRPr>
+                <a:solidFill>
+                  <a:schemeClr val="tx2"/>
+                </a:solidFill>
+              </a:defRPr>
+            </a:lvl2pPr>
+            <a:lvl3pPr>
+              <a:defRPr>
+                <a:solidFill>
+                  <a:schemeClr val="tx2"/>
+                </a:solidFill>
+              </a:defRPr>
+            </a:lvl3pPr>
+            <a:lvl4pPr>
+              <a:defRPr>
+                <a:solidFill>
+                  <a:schemeClr val="tx2"/>
+                </a:solidFill>
+              </a:defRPr>
+            </a:lvl4pPr>
+            <a:lvl5pPr>
+              <a:defRPr>
+                <a:solidFill>
+                  <a:schemeClr val="tx2"/>
+                </a:solidFill>
+              </a:defRPr>
+            </a:lvl5pPr>
+            <a:lvl6pPr>
+              <a:defRPr>
+                <a:solidFill>
+                  <a:schemeClr val="tx2"/>
+                </a:solidFill>
+              </a:defRPr>
+            </a:lvl6pPr>
+            <a:lvl7pPr>
+              <a:defRPr>
+                <a:solidFill>
+                  <a:schemeClr val="tx2"/>
+                </a:solidFill>
+              </a:defRPr>
+            </a:lvl7pPr>
+            <a:lvl8pPr>
+              <a:defRPr>
+                <a:solidFill>
+                  <a:schemeClr val="tx2"/>
+                </a:solidFill>
+              </a:defRPr>
+            </a:lvl8pPr>
+            <a:lvl9pPr>
+              <a:defRPr>
+                <a:solidFill>
+                  <a:schemeClr val="tx2"/>
+                </a:solidFill>
+              </a:defRPr>
+            </a:lvl9pPr>
+          </a:lstStyle>
+          <a:p>
+            <a:pPr lvl="0"/>
+            <a:r>
+              <a:rPr lang="en-US" sz="8000" dirty="0">
+                <a:solidFill>
+                  <a:schemeClr val="tx1"/>
+                </a:solidFill>
+                <a:effectLst/>
+              </a:rPr>
+              <a:t>“</a:t>
+            </a:r>
+          </a:p>
+        </p:txBody>
+      </p:sp>
+      <p:sp>
+        <p:nvSpPr>
+          <p:cNvPr id="10" name="TextBox 9"/>
+          <p:cNvSpPr txBox="1"/>
+          <p:nvPr/>
+        </p:nvSpPr>
+        <p:spPr>
+          <a:xfrm>
+            <a:off x="10984230" y="2701290"/>
+            <a:ext cx="609600" cy="584776"/>
+          </a:xfrm>
+          <a:prstGeom prst="rect">
+            <a:avLst/>
+          </a:prstGeom>
+        </p:spPr>
+        <p:txBody>
+          <a:bodyPr vert="horz" lIns="91440" tIns="45720" rIns="91440" bIns="45720" rtlCol="0" anchor="ctr">
+            <a:noAutofit/>
+          </a:bodyPr>
+          <a:lstStyle>
+            <a:lvl1pPr>
+              <a:spcBef>
+                <a:spcPct val="0"/>
+              </a:spcBef>
+              <a:buNone/>
+              <a:defRPr sz="3200" b="0" cap="all">
+                <a:ln w="3175" cmpd="sng">
+                  <a:noFill/>
+                </a:ln>
+                <a:effectLst>
+                  <a:glow rad="38100">
+                    <a:schemeClr val="bg1">
+                      <a:lumMod val="65000"/>
+                      <a:lumOff val="35000"/>
+                      <a:alpha val="40000"/>
+                    </a:schemeClr>
+                  </a:glow>
+                  <a:outerShdw blurRad="28575" dist="38100" dir="14040000" algn="tl" rotWithShape="0">
+                    <a:srgbClr val="000000">
+                      <a:alpha val="25000"/>
+                    </a:srgbClr>
+                  </a:outerShdw>
+                </a:effectLst>
+              </a:defRPr>
+            </a:lvl1pPr>
+            <a:lvl2pPr>
+              <a:defRPr>
+                <a:solidFill>
+                  <a:schemeClr val="tx2"/>
+                </a:solidFill>
+              </a:defRPr>
+            </a:lvl2pPr>
+            <a:lvl3pPr>
+              <a:defRPr>
+                <a:solidFill>
+                  <a:schemeClr val="tx2"/>
+                </a:solidFill>
+              </a:defRPr>
+            </a:lvl3pPr>
+            <a:lvl4pPr>
+              <a:defRPr>
+                <a:solidFill>
+                  <a:schemeClr val="tx2"/>
+                </a:solidFill>
+              </a:defRPr>
+            </a:lvl4pPr>
+            <a:lvl5pPr>
+              <a:defRPr>
+                <a:solidFill>
+                  <a:schemeClr val="tx2"/>
+                </a:solidFill>
+              </a:defRPr>
+            </a:lvl5pPr>
+            <a:lvl6pPr>
+              <a:defRPr>
+                <a:solidFill>
+                  <a:schemeClr val="tx2"/>
+                </a:solidFill>
+              </a:defRPr>
+            </a:lvl6pPr>
+            <a:lvl7pPr>
+              <a:defRPr>
+                <a:solidFill>
+                  <a:schemeClr val="tx2"/>
+                </a:solidFill>
+              </a:defRPr>
+            </a:lvl7pPr>
+            <a:lvl8pPr>
+              <a:defRPr>
+                <a:solidFill>
+                  <a:schemeClr val="tx2"/>
+                </a:solidFill>
+              </a:defRPr>
+            </a:lvl8pPr>
+            <a:lvl9pPr>
+              <a:defRPr>
+                <a:solidFill>
+                  <a:schemeClr val="tx2"/>
+                </a:solidFill>
+              </a:defRPr>
+            </a:lvl9pPr>
+          </a:lstStyle>
+          <a:p>
+            <a:pPr lvl="0" algn="r"/>
+            <a:r>
+              <a:rPr lang="en-US" sz="8000" dirty="0">
+                <a:solidFill>
+                  <a:schemeClr val="tx1"/>
+                </a:solidFill>
+                <a:effectLst/>
+              </a:rPr>
+              <a:t>”</a:t>
+            </a:r>
+          </a:p>
+        </p:txBody>
+      </p:sp>
+    </p:spTree>
+    <p:extLst>
+      <p:ext uri="{BB962C8B-B14F-4D97-AF65-F5344CB8AC3E}">
+        <p14:creationId xmlns:p14="http://schemas.microsoft.com/office/powerpoint/2010/main" val="104310049"/>
+      </p:ext>
+    </p:extLst>
+  </p:cSld>
+  <p:clrMapOvr>
+    <a:masterClrMapping/>
+  </p:clrMapOvr>
+</p:sldLayout>
+</file>
+
+<file path=ppt/slideLayouts/slideLayout13.xml><?xml version="1.0" encoding="utf-8"?>
+<p:sldLayout xmlns:a="http://schemas.openxmlformats.org/drawingml/2006/main" xmlns:r="http://schemas.openxmlformats.org/officeDocument/2006/relationships" xmlns:p="http://schemas.openxmlformats.org/presentationml/2006/main" showMasterSp="0" preserve="1">
+  <p:cSld name="Name Card">
+    <p:spTree>
+      <p:nvGrpSpPr>
+        <p:cNvPr id="1" name=""/>
+        <p:cNvGrpSpPr/>
+        <p:nvPr/>
+      </p:nvGrpSpPr>
+      <p:grpSpPr>
+        <a:xfrm>
+          <a:off x="0" y="0"/>
+          <a:ext cx="0" cy="0"/>
+          <a:chOff x="0" y="0"/>
+          <a:chExt cx="0" cy="0"/>
+        </a:xfrm>
+      </p:grpSpPr>
+      <p:pic>
+        <p:nvPicPr>
+          <p:cNvPr id="9" name="Picture 8" descr="C0-HD-BTM.png"/>
+          <p:cNvPicPr>
+            <a:picLocks noChangeAspect="1"/>
+          </p:cNvPicPr>
+          <p:nvPr/>
+        </p:nvPicPr>
+        <p:blipFill>
+          <a:blip r:embed="rId2">
+            <a:extLst>
+              <a:ext uri="{28A0092B-C50C-407E-A947-70E740481C1C}">
+                <a14:useLocalDpi xmlns:a14="http://schemas.microsoft.com/office/drawing/2010/main" val="0"/>
+              </a:ext>
+            </a:extLst>
+          </a:blip>
+          <a:stretch>
+            <a:fillRect/>
+          </a:stretch>
+        </p:blipFill>
+        <p:spPr>
+          <a:xfrm>
+            <a:off x="0" y="4375150"/>
+            <a:ext cx="12192000" cy="2482850"/>
+          </a:xfrm>
+          <a:prstGeom prst="rect">
+            <a:avLst/>
+          </a:prstGeom>
+        </p:spPr>
+      </p:pic>
+      <p:sp>
+        <p:nvSpPr>
+          <p:cNvPr id="2" name="Title 1"/>
+          <p:cNvSpPr>
+            <a:spLocks noGrp="1"/>
+          </p:cNvSpPr>
+          <p:nvPr>
+            <p:ph type="title"/>
+          </p:nvPr>
+        </p:nvSpPr>
+        <p:spPr>
+          <a:xfrm>
+            <a:off x="1024495" y="1124701"/>
+            <a:ext cx="10146186" cy="2511835"/>
+          </a:xfrm>
+        </p:spPr>
+        <p:txBody>
+          <a:bodyPr anchor="b"/>
+          <a:lstStyle>
+            <a:lvl1pPr algn="l">
+              <a:defRPr sz="3200"/>
+            </a:lvl1pPr>
+          </a:lstStyle>
+          <a:p>
+            <a:r>
+              <a:rPr lang="en-US" smtClean="0"/>
+              <a:t>Click to edit Master title style</a:t>
+            </a:r>
+            <a:endParaRPr lang="en-US" dirty="0"/>
+          </a:p>
+        </p:txBody>
+      </p:sp>
+      <p:sp>
+        <p:nvSpPr>
+          <p:cNvPr id="4" name="Text Placeholder 3"/>
+          <p:cNvSpPr>
+            <a:spLocks noGrp="1"/>
+          </p:cNvSpPr>
+          <p:nvPr>
+            <p:ph type="body" sz="half" idx="2"/>
+          </p:nvPr>
+        </p:nvSpPr>
+        <p:spPr>
+          <a:xfrm>
+            <a:off x="1024467" y="3648315"/>
+            <a:ext cx="10144654" cy="999885"/>
+          </a:xfrm>
+        </p:spPr>
+        <p:txBody>
+          <a:bodyPr anchor="t"/>
+          <a:lstStyle>
+            <a:lvl1pPr marL="0" indent="0">
+              <a:buNone/>
+              <a:defRPr sz="1600"/>
+            </a:lvl1pPr>
+            <a:lvl2pPr marL="457200" indent="0">
+              <a:buNone/>
+              <a:defRPr sz="1400"/>
+            </a:lvl2pPr>
+            <a:lvl3pPr marL="914400" indent="0">
+              <a:buNone/>
+              <a:defRPr sz="1200"/>
+            </a:lvl3pPr>
+            <a:lvl4pPr marL="1371600" indent="0">
+              <a:buNone/>
+              <a:defRPr sz="1000"/>
+            </a:lvl4pPr>
+            <a:lvl5pPr marL="1828800" indent="0">
+              <a:buNone/>
+              <a:defRPr sz="1000"/>
+            </a:lvl5pPr>
+            <a:lvl6pPr marL="2286000" indent="0">
+              <a:buNone/>
+              <a:defRPr sz="1000"/>
+            </a:lvl6pPr>
+            <a:lvl7pPr marL="2743200" indent="0">
+              <a:buNone/>
+              <a:defRPr sz="1000"/>
+            </a:lvl7pPr>
+            <a:lvl8pPr marL="3200400" indent="0">
+              <a:buNone/>
+              <a:defRPr sz="1000"/>
+            </a:lvl8pPr>
+            <a:lvl9pPr marL="3657600" indent="0">
+              <a:buNone/>
+              <a:defRPr sz="1000"/>
+            </a:lvl9pPr>
+          </a:lstStyle>
+          <a:p>
+            <a:pPr lvl="0"/>
+            <a:r>
+              <a:rPr lang="en-US" smtClean="0"/>
+              <a:t>Edit Master text styles</a:t>
+            </a:r>
+          </a:p>
+        </p:txBody>
+      </p:sp>
+      <p:sp>
+        <p:nvSpPr>
+          <p:cNvPr id="5" name="Date Placeholder 4"/>
+          <p:cNvSpPr>
+            <a:spLocks noGrp="1"/>
+          </p:cNvSpPr>
+          <p:nvPr>
+            <p:ph type="dt" sz="half" idx="10"/>
+          </p:nvPr>
+        </p:nvSpPr>
+        <p:spPr>
+          <a:xfrm>
+            <a:off x="7814452" y="378883"/>
+            <a:ext cx="2910840" cy="365125"/>
+          </a:xfrm>
+        </p:spPr>
+        <p:txBody>
+          <a:bodyPr/>
+          <a:lstStyle>
+            <a:lvl1pPr algn="r">
+              <a:defRPr/>
+            </a:lvl1pPr>
+          </a:lstStyle>
+          <a:p>
+            <a:fld id="{C3EFDFBE-452F-4584-8B26-C2A765DE53D2}" type="datetime1">
+              <a:rPr lang="en-US" smtClean="0"/>
+              <a:t>10/23/2017</a:t>
+            </a:fld>
+            <a:endParaRPr lang="en-US"/>
+          </a:p>
+        </p:txBody>
+      </p:sp>
+      <p:sp>
+        <p:nvSpPr>
+          <p:cNvPr id="6" name="Footer Placeholder 5"/>
+          <p:cNvSpPr>
+            <a:spLocks noGrp="1"/>
+          </p:cNvSpPr>
+          <p:nvPr>
+            <p:ph type="ftr" sz="quarter" idx="11"/>
+          </p:nvPr>
+        </p:nvSpPr>
+        <p:spPr>
+          <a:xfrm>
+            <a:off x="685800" y="378883"/>
+            <a:ext cx="6991492" cy="365125"/>
+          </a:xfrm>
+        </p:spPr>
+        <p:txBody>
+          <a:bodyPr/>
+          <a:lstStyle/>
+          <a:p>
+            <a:endParaRPr lang="en-US"/>
+          </a:p>
+        </p:txBody>
+      </p:sp>
+      <p:sp>
+        <p:nvSpPr>
+          <p:cNvPr id="7" name="Slide Number Placeholder 6"/>
+          <p:cNvSpPr>
+            <a:spLocks noGrp="1"/>
+          </p:cNvSpPr>
+          <p:nvPr>
+            <p:ph type="sldNum" sz="quarter" idx="12"/>
+          </p:nvPr>
+        </p:nvSpPr>
+        <p:spPr>
+          <a:xfrm>
+            <a:off x="10862452" y="381000"/>
+            <a:ext cx="643748" cy="365125"/>
+          </a:xfrm>
+        </p:spPr>
+        <p:txBody>
+          <a:bodyPr/>
+          <a:lstStyle/>
+          <a:p>
+            <a:fld id="{6DA7AA4B-8849-44DE-A3E8-A263F985E91B}" type="slidenum">
+              <a:rPr lang="en-US" smtClean="0"/>
+              <a:t>‹#›</a:t>
+            </a:fld>
+            <a:endParaRPr lang="en-US"/>
+          </a:p>
+        </p:txBody>
+      </p:sp>
+    </p:spTree>
+    <p:extLst>
+      <p:ext uri="{BB962C8B-B14F-4D97-AF65-F5344CB8AC3E}">
+        <p14:creationId xmlns:p14="http://schemas.microsoft.com/office/powerpoint/2010/main" val="2443685584"/>
+      </p:ext>
+    </p:extLst>
+  </p:cSld>
+  <p:clrMapOvr>
+    <a:masterClrMapping/>
+  </p:clrMapOvr>
+</p:sldLayout>
+</file>
+
+<file path=ppt/slideLayouts/slideLayout14.xml><?xml version="1.0" encoding="utf-8"?>
+<p:sldLayout xmlns:a="http://schemas.openxmlformats.org/drawingml/2006/main" xmlns:r="http://schemas.openxmlformats.org/officeDocument/2006/relationships" xmlns:p="http://schemas.openxmlformats.org/presentationml/2006/main" preserve="1">
+  <p:cSld name="3 Column">
+    <p:spTree>
+      <p:nvGrpSpPr>
+        <p:cNvPr id="1" name=""/>
+        <p:cNvGrpSpPr/>
+        <p:nvPr/>
+      </p:nvGrpSpPr>
+      <p:grpSpPr>
+        <a:xfrm>
+          <a:off x="0" y="0"/>
+          <a:ext cx="0" cy="0"/>
+          <a:chOff x="0" y="0"/>
+          <a:chExt cx="0" cy="0"/>
+        </a:xfrm>
+      </p:grpSpPr>
+      <p:sp>
+        <p:nvSpPr>
+          <p:cNvPr id="15" name="Title 1"/>
+          <p:cNvSpPr>
+            <a:spLocks noGrp="1"/>
+          </p:cNvSpPr>
+          <p:nvPr>
+            <p:ph type="title"/>
+          </p:nvPr>
+        </p:nvSpPr>
+        <p:spPr>
+          <a:xfrm>
+            <a:off x="2895600" y="761999"/>
+            <a:ext cx="8610599" cy="1303867"/>
+          </a:xfrm>
+        </p:spPr>
+        <p:txBody>
+          <a:bodyPr/>
+          <a:lstStyle/>
+          <a:p>
+            <a:r>
+              <a:rPr lang="en-US" smtClean="0"/>
+              <a:t>Click to edit Master title style</a:t>
+            </a:r>
+            <a:endParaRPr lang="en-US" dirty="0"/>
+          </a:p>
+        </p:txBody>
+      </p:sp>
+      <p:sp>
+        <p:nvSpPr>
+          <p:cNvPr id="7" name="Text Placeholder 2"/>
+          <p:cNvSpPr>
+            <a:spLocks noGrp="1"/>
+          </p:cNvSpPr>
+          <p:nvPr>
+            <p:ph type="body" idx="1"/>
+          </p:nvPr>
+        </p:nvSpPr>
+        <p:spPr>
+          <a:xfrm>
+            <a:off x="685800" y="2202080"/>
+            <a:ext cx="3456432" cy="617320"/>
+          </a:xfrm>
+        </p:spPr>
+        <p:txBody>
+          <a:bodyPr anchor="b">
+            <a:noAutofit/>
+          </a:bodyPr>
+          <a:lstStyle>
+            <a:lvl1pPr marL="0" indent="0">
+              <a:buNone/>
+              <a:defRPr sz="2400" b="0">
+                <a:solidFill>
+                  <a:schemeClr val="tx1"/>
+                </a:solidFill>
+              </a:defRPr>
+            </a:lvl1pPr>
+            <a:lvl2pPr marL="457200" indent="0">
+              <a:buNone/>
+              <a:defRPr sz="2000" b="1"/>
+            </a:lvl2pPr>
+            <a:lvl3pPr marL="914400" indent="0">
+              <a:buNone/>
+              <a:defRPr sz="1800" b="1"/>
+            </a:lvl3pPr>
+            <a:lvl4pPr marL="1371600" indent="0">
+              <a:buNone/>
+              <a:defRPr sz="1600" b="1"/>
+            </a:lvl4pPr>
+            <a:lvl5pPr marL="1828800" indent="0">
+              <a:buNone/>
+              <a:defRPr sz="1600" b="1"/>
+            </a:lvl5pPr>
+            <a:lvl6pPr marL="2286000" indent="0">
+              <a:buNone/>
+              <a:defRPr sz="1600" b="1"/>
+            </a:lvl6pPr>
+            <a:lvl7pPr marL="2743200" indent="0">
+              <a:buNone/>
+              <a:defRPr sz="1600" b="1"/>
+            </a:lvl7pPr>
+            <a:lvl8pPr marL="3200400" indent="0">
+              <a:buNone/>
+              <a:defRPr sz="1600" b="1"/>
+            </a:lvl8pPr>
+            <a:lvl9pPr marL="3657600" indent="0">
+              <a:buNone/>
+              <a:defRPr sz="1600" b="1"/>
+            </a:lvl9pPr>
+          </a:lstStyle>
+          <a:p>
+            <a:pPr lvl="0"/>
+            <a:r>
+              <a:rPr lang="en-US" smtClean="0"/>
+              <a:t>Edit Master text styles</a:t>
+            </a:r>
+          </a:p>
+        </p:txBody>
+      </p:sp>
+      <p:sp>
+        <p:nvSpPr>
+          <p:cNvPr id="8" name="Text Placeholder 3"/>
+          <p:cNvSpPr>
+            <a:spLocks noGrp="1"/>
+          </p:cNvSpPr>
+          <p:nvPr>
+            <p:ph type="body" sz="half" idx="15"/>
+          </p:nvPr>
+        </p:nvSpPr>
+        <p:spPr>
+          <a:xfrm>
+            <a:off x="685799" y="2904565"/>
+            <a:ext cx="3456432" cy="3314132"/>
+          </a:xfrm>
+        </p:spPr>
+        <p:txBody>
+          <a:bodyPr anchor="t">
+            <a:normAutofit/>
+          </a:bodyPr>
+          <a:lstStyle>
+            <a:lvl1pPr marL="0" indent="0">
+              <a:buNone/>
+              <a:defRPr sz="1400"/>
+            </a:lvl1pPr>
+            <a:lvl2pPr marL="457200" indent="0">
+              <a:buNone/>
+              <a:defRPr sz="1200"/>
+            </a:lvl2pPr>
+            <a:lvl3pPr marL="914400" indent="0">
+              <a:buNone/>
+              <a:defRPr sz="1000"/>
+            </a:lvl3pPr>
+            <a:lvl4pPr marL="1371600" indent="0">
+              <a:buNone/>
+              <a:defRPr sz="900"/>
+            </a:lvl4pPr>
+            <a:lvl5pPr marL="1828800" indent="0">
+              <a:buNone/>
+              <a:defRPr sz="900"/>
+            </a:lvl5pPr>
+            <a:lvl6pPr marL="2286000" indent="0">
+              <a:buNone/>
+              <a:defRPr sz="900"/>
+            </a:lvl6pPr>
+            <a:lvl7pPr marL="2743200" indent="0">
+              <a:buNone/>
+              <a:defRPr sz="900"/>
+            </a:lvl7pPr>
+            <a:lvl8pPr marL="3200400" indent="0">
+              <a:buNone/>
+              <a:defRPr sz="900"/>
+            </a:lvl8pPr>
+            <a:lvl9pPr marL="3657600" indent="0">
+              <a:buNone/>
+              <a:defRPr sz="900"/>
+            </a:lvl9pPr>
+          </a:lstStyle>
+          <a:p>
+            <a:pPr lvl="0"/>
+            <a:r>
+              <a:rPr lang="en-US" smtClean="0"/>
+              <a:t>Edit Master text styles</a:t>
+            </a:r>
+          </a:p>
+        </p:txBody>
+      </p:sp>
+      <p:sp>
+        <p:nvSpPr>
+          <p:cNvPr id="9" name="Text Placeholder 4"/>
+          <p:cNvSpPr>
+            <a:spLocks noGrp="1"/>
+          </p:cNvSpPr>
+          <p:nvPr>
+            <p:ph type="body" sz="quarter" idx="3"/>
+          </p:nvPr>
+        </p:nvSpPr>
+        <p:spPr>
+          <a:xfrm>
+            <a:off x="4368800" y="2201333"/>
+            <a:ext cx="3456432" cy="626534"/>
+          </a:xfrm>
+        </p:spPr>
+        <p:txBody>
+          <a:bodyPr anchor="b">
+            <a:noAutofit/>
+          </a:bodyPr>
+          <a:lstStyle>
+            <a:lvl1pPr marL="0" indent="0">
+              <a:buNone/>
+              <a:defRPr sz="2400" b="0">
+                <a:solidFill>
+                  <a:schemeClr val="tx1"/>
+                </a:solidFill>
+              </a:defRPr>
+            </a:lvl1pPr>
+            <a:lvl2pPr marL="457200" indent="0">
+              <a:buNone/>
+              <a:defRPr sz="2000" b="1"/>
+            </a:lvl2pPr>
+            <a:lvl3pPr marL="914400" indent="0">
+              <a:buNone/>
+              <a:defRPr sz="1800" b="1"/>
+            </a:lvl3pPr>
+            <a:lvl4pPr marL="1371600" indent="0">
+              <a:buNone/>
+              <a:defRPr sz="1600" b="1"/>
+            </a:lvl4pPr>
+            <a:lvl5pPr marL="1828800" indent="0">
+              <a:buNone/>
+              <a:defRPr sz="1600" b="1"/>
+            </a:lvl5pPr>
+            <a:lvl6pPr marL="2286000" indent="0">
+              <a:buNone/>
+              <a:defRPr sz="1600" b="1"/>
+            </a:lvl6pPr>
+            <a:lvl7pPr marL="2743200" indent="0">
+              <a:buNone/>
+              <a:defRPr sz="1600" b="1"/>
+            </a:lvl7pPr>
+            <a:lvl8pPr marL="3200400" indent="0">
+              <a:buNone/>
+              <a:defRPr sz="1600" b="1"/>
+            </a:lvl8pPr>
+            <a:lvl9pPr marL="3657600" indent="0">
+              <a:buNone/>
+              <a:defRPr sz="1600" b="1"/>
+            </a:lvl9pPr>
+          </a:lstStyle>
+          <a:p>
+            <a:pPr lvl="0"/>
+            <a:r>
+              <a:rPr lang="en-US" smtClean="0"/>
+              <a:t>Edit Master text styles</a:t>
+            </a:r>
+          </a:p>
+        </p:txBody>
+      </p:sp>
+      <p:sp>
+        <p:nvSpPr>
+          <p:cNvPr id="10" name="Text Placeholder 3"/>
+          <p:cNvSpPr>
+            <a:spLocks noGrp="1"/>
+          </p:cNvSpPr>
+          <p:nvPr>
+            <p:ph type="body" sz="half" idx="16"/>
+          </p:nvPr>
+        </p:nvSpPr>
+        <p:spPr>
+          <a:xfrm>
+            <a:off x="4366858" y="2904067"/>
+            <a:ext cx="3456432" cy="3314618"/>
+          </a:xfrm>
+        </p:spPr>
+        <p:txBody>
+          <a:bodyPr anchor="t">
+            <a:normAutofit/>
+          </a:bodyPr>
+          <a:lstStyle>
+            <a:lvl1pPr marL="0" indent="0">
+              <a:buNone/>
+              <a:defRPr sz="1400"/>
+            </a:lvl1pPr>
+            <a:lvl2pPr marL="457200" indent="0">
+              <a:buNone/>
+              <a:defRPr sz="1200"/>
+            </a:lvl2pPr>
+            <a:lvl3pPr marL="914400" indent="0">
+              <a:buNone/>
+              <a:defRPr sz="1000"/>
+            </a:lvl3pPr>
+            <a:lvl4pPr marL="1371600" indent="0">
+              <a:buNone/>
+              <a:defRPr sz="900"/>
+            </a:lvl4pPr>
+            <a:lvl5pPr marL="1828800" indent="0">
+              <a:buNone/>
+              <a:defRPr sz="900"/>
+            </a:lvl5pPr>
+            <a:lvl6pPr marL="2286000" indent="0">
+              <a:buNone/>
+              <a:defRPr sz="900"/>
+            </a:lvl6pPr>
+            <a:lvl7pPr marL="2743200" indent="0">
+              <a:buNone/>
+              <a:defRPr sz="900"/>
+            </a:lvl7pPr>
+            <a:lvl8pPr marL="3200400" indent="0">
+              <a:buNone/>
+              <a:defRPr sz="900"/>
+            </a:lvl8pPr>
+            <a:lvl9pPr marL="3657600" indent="0">
+              <a:buNone/>
+              <a:defRPr sz="900"/>
+            </a:lvl9pPr>
+          </a:lstStyle>
+          <a:p>
+            <a:pPr lvl="0"/>
+            <a:r>
+              <a:rPr lang="en-US" smtClean="0"/>
+              <a:t>Edit Master text styles</a:t>
+            </a:r>
+          </a:p>
+        </p:txBody>
+      </p:sp>
+      <p:sp>
+        <p:nvSpPr>
+          <p:cNvPr id="11" name="Text Placeholder 4"/>
+          <p:cNvSpPr>
+            <a:spLocks noGrp="1"/>
+          </p:cNvSpPr>
+          <p:nvPr>
+            <p:ph type="body" sz="quarter" idx="13"/>
+          </p:nvPr>
+        </p:nvSpPr>
+        <p:spPr>
+          <a:xfrm>
+            <a:off x="8051800" y="2192866"/>
+            <a:ext cx="3456432" cy="626534"/>
+          </a:xfrm>
+        </p:spPr>
+        <p:txBody>
+          <a:bodyPr anchor="b">
+            <a:noAutofit/>
+          </a:bodyPr>
+          <a:lstStyle>
+            <a:lvl1pPr marL="0" indent="0">
+              <a:buNone/>
+              <a:defRPr sz="2400" b="0">
+                <a:solidFill>
+                  <a:schemeClr val="tx1"/>
+                </a:solidFill>
+              </a:defRPr>
+            </a:lvl1pPr>
+            <a:lvl2pPr marL="457200" indent="0">
+              <a:buNone/>
+              <a:defRPr sz="2000" b="1"/>
+            </a:lvl2pPr>
+            <a:lvl3pPr marL="914400" indent="0">
+              <a:buNone/>
+              <a:defRPr sz="1800" b="1"/>
+            </a:lvl3pPr>
+            <a:lvl4pPr marL="1371600" indent="0">
+              <a:buNone/>
+              <a:defRPr sz="1600" b="1"/>
+            </a:lvl4pPr>
+            <a:lvl5pPr marL="1828800" indent="0">
+              <a:buNone/>
+              <a:defRPr sz="1600" b="1"/>
+            </a:lvl5pPr>
+            <a:lvl6pPr marL="2286000" indent="0">
+              <a:buNone/>
+              <a:defRPr sz="1600" b="1"/>
+            </a:lvl6pPr>
+            <a:lvl7pPr marL="2743200" indent="0">
+              <a:buNone/>
+              <a:defRPr sz="1600" b="1"/>
+            </a:lvl7pPr>
+            <a:lvl8pPr marL="3200400" indent="0">
+              <a:buNone/>
+              <a:defRPr sz="1600" b="1"/>
+            </a:lvl8pPr>
+            <a:lvl9pPr marL="3657600" indent="0">
+              <a:buNone/>
+              <a:defRPr sz="1600" b="1"/>
+            </a:lvl9pPr>
+          </a:lstStyle>
+          <a:p>
+            <a:pPr lvl="0"/>
+            <a:r>
+              <a:rPr lang="en-US" smtClean="0"/>
+              <a:t>Edit Master text styles</a:t>
+            </a:r>
+          </a:p>
+        </p:txBody>
+      </p:sp>
+      <p:sp>
+        <p:nvSpPr>
+          <p:cNvPr id="12" name="Text Placeholder 3"/>
+          <p:cNvSpPr>
+            <a:spLocks noGrp="1"/>
+          </p:cNvSpPr>
+          <p:nvPr>
+            <p:ph type="body" sz="half" idx="17"/>
+          </p:nvPr>
+        </p:nvSpPr>
+        <p:spPr>
+          <a:xfrm>
+            <a:off x="8051801" y="2904565"/>
+            <a:ext cx="3456432" cy="3314132"/>
+          </a:xfrm>
+        </p:spPr>
+        <p:txBody>
+          <a:bodyPr anchor="t">
+            <a:normAutofit/>
+          </a:bodyPr>
+          <a:lstStyle>
+            <a:lvl1pPr marL="0" indent="0">
+              <a:buNone/>
+              <a:defRPr sz="1400"/>
+            </a:lvl1pPr>
+            <a:lvl2pPr marL="457200" indent="0">
+              <a:buNone/>
+              <a:defRPr sz="1200"/>
+            </a:lvl2pPr>
+            <a:lvl3pPr marL="914400" indent="0">
+              <a:buNone/>
+              <a:defRPr sz="1000"/>
+            </a:lvl3pPr>
+            <a:lvl4pPr marL="1371600" indent="0">
+              <a:buNone/>
+              <a:defRPr sz="900"/>
+            </a:lvl4pPr>
+            <a:lvl5pPr marL="1828800" indent="0">
+              <a:buNone/>
+              <a:defRPr sz="900"/>
+            </a:lvl5pPr>
+            <a:lvl6pPr marL="2286000" indent="0">
+              <a:buNone/>
+              <a:defRPr sz="900"/>
+            </a:lvl6pPr>
+            <a:lvl7pPr marL="2743200" indent="0">
+              <a:buNone/>
+              <a:defRPr sz="900"/>
+            </a:lvl7pPr>
+            <a:lvl8pPr marL="3200400" indent="0">
+              <a:buNone/>
+              <a:defRPr sz="900"/>
+            </a:lvl8pPr>
+            <a:lvl9pPr marL="3657600" indent="0">
+              <a:buNone/>
+              <a:defRPr sz="900"/>
+            </a:lvl9pPr>
+          </a:lstStyle>
+          <a:p>
+            <a:pPr lvl="0"/>
+            <a:r>
+              <a:rPr lang="en-US" smtClean="0"/>
+              <a:t>Edit Master text styles</a:t>
+            </a:r>
+          </a:p>
+        </p:txBody>
+      </p:sp>
+      <p:sp>
+        <p:nvSpPr>
+          <p:cNvPr id="3" name="Date Placeholder 2"/>
+          <p:cNvSpPr>
+            <a:spLocks noGrp="1"/>
+          </p:cNvSpPr>
+          <p:nvPr>
+            <p:ph type="dt" sz="half" idx="10"/>
+          </p:nvPr>
+        </p:nvSpPr>
+        <p:spPr/>
+        <p:txBody>
+          <a:bodyPr/>
+          <a:lstStyle/>
+          <a:p>
+            <a:fld id="{B91A7003-207C-4593-86CB-8AB77FF732C7}" type="datetime1">
+              <a:rPr lang="en-US" smtClean="0"/>
+              <a:t>10/23/2017</a:t>
+            </a:fld>
+            <a:endParaRPr lang="en-US"/>
+          </a:p>
+        </p:txBody>
+      </p:sp>
+      <p:sp>
+        <p:nvSpPr>
+          <p:cNvPr id="4" name="Footer Placeholder 3"/>
+          <p:cNvSpPr>
+            <a:spLocks noGrp="1"/>
+          </p:cNvSpPr>
+          <p:nvPr>
+            <p:ph type="ftr" sz="quarter" idx="11"/>
+          </p:nvPr>
+        </p:nvSpPr>
+        <p:spPr/>
+        <p:txBody>
+          <a:bodyPr/>
+          <a:lstStyle/>
+          <a:p>
+            <a:endParaRPr lang="en-US"/>
+          </a:p>
+        </p:txBody>
+      </p:sp>
+      <p:sp>
+        <p:nvSpPr>
+          <p:cNvPr id="5" name="Slide Number Placeholder 4"/>
+          <p:cNvSpPr>
+            <a:spLocks noGrp="1"/>
+          </p:cNvSpPr>
+          <p:nvPr>
+            <p:ph type="sldNum" sz="quarter" idx="12"/>
+          </p:nvPr>
+        </p:nvSpPr>
+        <p:spPr/>
+        <p:txBody>
+          <a:bodyPr/>
+          <a:lstStyle/>
+          <a:p>
+            <a:fld id="{6DA7AA4B-8849-44DE-A3E8-A263F985E91B}" type="slidenum">
+              <a:rPr lang="en-US" smtClean="0"/>
+              <a:t>‹#›</a:t>
+            </a:fld>
+            <a:endParaRPr lang="en-US"/>
+          </a:p>
+        </p:txBody>
+      </p:sp>
+    </p:spTree>
+    <p:extLst>
+      <p:ext uri="{BB962C8B-B14F-4D97-AF65-F5344CB8AC3E}">
+        <p14:creationId xmlns:p14="http://schemas.microsoft.com/office/powerpoint/2010/main" val="1348618193"/>
+      </p:ext>
+    </p:extLst>
+  </p:cSld>
+  <p:clrMapOvr>
+    <a:masterClrMapping/>
+  </p:clrMapOvr>
+</p:sldLayout>
+</file>
+
+<file path=ppt/slideLayouts/slideLayout15.xml><?xml version="1.0" encoding="utf-8"?>
+<p:sldLayout xmlns:a="http://schemas.openxmlformats.org/drawingml/2006/main" xmlns:r="http://schemas.openxmlformats.org/officeDocument/2006/relationships" xmlns:p="http://schemas.openxmlformats.org/presentationml/2006/main" preserve="1">
+  <p:cSld name="3 Picture Column">
+    <p:spTree>
+      <p:nvGrpSpPr>
+        <p:cNvPr id="1" name=""/>
+        <p:cNvGrpSpPr/>
+        <p:nvPr/>
+      </p:nvGrpSpPr>
+      <p:grpSpPr>
+        <a:xfrm>
+          <a:off x="0" y="0"/>
+          <a:ext cx="0" cy="0"/>
+          <a:chOff x="0" y="0"/>
+          <a:chExt cx="0" cy="0"/>
+        </a:xfrm>
+      </p:grpSpPr>
+      <p:sp>
+        <p:nvSpPr>
+          <p:cNvPr id="30" name="Title 1"/>
+          <p:cNvSpPr>
+            <a:spLocks noGrp="1"/>
+          </p:cNvSpPr>
+          <p:nvPr>
+            <p:ph type="title"/>
+          </p:nvPr>
+        </p:nvSpPr>
+        <p:spPr>
+          <a:xfrm>
+            <a:off x="2895600" y="762000"/>
+            <a:ext cx="8610599" cy="1295400"/>
+          </a:xfrm>
+        </p:spPr>
+        <p:txBody>
+          <a:bodyPr/>
+          <a:lstStyle/>
+          <a:p>
+            <a:r>
+              <a:rPr lang="en-US" smtClean="0"/>
+              <a:t>Click to edit Master title style</a:t>
+            </a:r>
+            <a:endParaRPr lang="en-US" dirty="0"/>
+          </a:p>
+        </p:txBody>
+      </p:sp>
+      <p:sp>
+        <p:nvSpPr>
+          <p:cNvPr id="19" name="Text Placeholder 2"/>
+          <p:cNvSpPr>
+            <a:spLocks noGrp="1"/>
+          </p:cNvSpPr>
+          <p:nvPr>
+            <p:ph type="body" idx="1"/>
+          </p:nvPr>
+        </p:nvSpPr>
+        <p:spPr>
+          <a:xfrm>
+            <a:off x="688618" y="4191000"/>
+            <a:ext cx="3451582" cy="682765"/>
+          </a:xfrm>
+        </p:spPr>
+        <p:txBody>
+          <a:bodyPr anchor="b">
+            <a:noAutofit/>
+          </a:bodyPr>
+          <a:lstStyle>
+            <a:lvl1pPr marL="0" indent="0">
+              <a:buNone/>
+              <a:defRPr sz="2400" b="0">
+                <a:solidFill>
+                  <a:schemeClr val="tx1"/>
+                </a:solidFill>
+              </a:defRPr>
+            </a:lvl1pPr>
+            <a:lvl2pPr marL="457200" indent="0">
+              <a:buNone/>
+              <a:defRPr sz="2000" b="1"/>
+            </a:lvl2pPr>
+            <a:lvl3pPr marL="914400" indent="0">
+              <a:buNone/>
+              <a:defRPr sz="1800" b="1"/>
+            </a:lvl3pPr>
+            <a:lvl4pPr marL="1371600" indent="0">
+              <a:buNone/>
+              <a:defRPr sz="1600" b="1"/>
+            </a:lvl4pPr>
+            <a:lvl5pPr marL="1828800" indent="0">
+              <a:buNone/>
+              <a:defRPr sz="1600" b="1"/>
+            </a:lvl5pPr>
+            <a:lvl6pPr marL="2286000" indent="0">
+              <a:buNone/>
+              <a:defRPr sz="1600" b="1"/>
+            </a:lvl6pPr>
+            <a:lvl7pPr marL="2743200" indent="0">
+              <a:buNone/>
+              <a:defRPr sz="1600" b="1"/>
+            </a:lvl7pPr>
+            <a:lvl8pPr marL="3200400" indent="0">
+              <a:buNone/>
+              <a:defRPr sz="1600" b="1"/>
+            </a:lvl8pPr>
+            <a:lvl9pPr marL="3657600" indent="0">
+              <a:buNone/>
+              <a:defRPr sz="1600" b="1"/>
+            </a:lvl9pPr>
+          </a:lstStyle>
+          <a:p>
+            <a:pPr lvl="0"/>
+            <a:r>
+              <a:rPr lang="en-US" smtClean="0"/>
+              <a:t>Edit Master text styles</a:t>
+            </a:r>
+          </a:p>
+        </p:txBody>
+      </p:sp>
+      <p:sp>
+        <p:nvSpPr>
+          <p:cNvPr id="20" name="Picture Placeholder 2"/>
+          <p:cNvSpPr>
+            <a:spLocks noGrp="1" noChangeAspect="1"/>
+          </p:cNvSpPr>
+          <p:nvPr>
+            <p:ph type="pic" idx="15"/>
+          </p:nvPr>
+        </p:nvSpPr>
+        <p:spPr>
+          <a:xfrm>
+            <a:off x="688618" y="2362200"/>
+            <a:ext cx="3451582" cy="1524000"/>
+          </a:xfrm>
+          <a:prstGeom prst="roundRect">
+            <a:avLst>
+              <a:gd name="adj" fmla="val 0"/>
+            </a:avLst>
+          </a:prstGeom>
+          <a:effectLst>
+            <a:outerShdw blurRad="50800" dist="50800" dir="5400000" algn="tl" rotWithShape="0">
+              <a:srgbClr val="000000">
+                <a:alpha val="43000"/>
+              </a:srgbClr>
+            </a:outerShdw>
+          </a:effectLst>
+        </p:spPr>
+        <p:txBody>
+          <a:bodyPr anchor="t">
+            <a:normAutofit/>
+          </a:bodyPr>
+          <a:lstStyle>
+            <a:lvl1pPr marL="0" indent="0" algn="ctr">
+              <a:buNone/>
+              <a:defRPr sz="1600"/>
+            </a:lvl1pPr>
+            <a:lvl2pPr marL="457200" indent="0">
+              <a:buNone/>
+              <a:defRPr sz="1600"/>
+            </a:lvl2pPr>
+            <a:lvl3pPr marL="914400" indent="0">
+              <a:buNone/>
+              <a:defRPr sz="1600"/>
+            </a:lvl3pPr>
+            <a:lvl4pPr marL="1371600" indent="0">
+              <a:buNone/>
+              <a:defRPr sz="1600"/>
+            </a:lvl4pPr>
+            <a:lvl5pPr marL="1828800" indent="0">
+              <a:buNone/>
+              <a:defRPr sz="1600"/>
+            </a:lvl5pPr>
+            <a:lvl6pPr marL="2286000" indent="0">
+              <a:buNone/>
+              <a:defRPr sz="1600"/>
+            </a:lvl6pPr>
+            <a:lvl7pPr marL="2743200" indent="0">
+              <a:buNone/>
+              <a:defRPr sz="1600"/>
+            </a:lvl7pPr>
+            <a:lvl8pPr marL="3200400" indent="0">
+              <a:buNone/>
+              <a:defRPr sz="1600"/>
+            </a:lvl8pPr>
+            <a:lvl9pPr marL="3657600" indent="0">
+              <a:buNone/>
+              <a:defRPr sz="1600"/>
+            </a:lvl9pPr>
+          </a:lstStyle>
+          <a:p>
+            <a:r>
+              <a:rPr lang="en-US" smtClean="0"/>
+              <a:t>Click icon to add picture</a:t>
+            </a:r>
+            <a:endParaRPr lang="en-US" dirty="0"/>
+          </a:p>
+        </p:txBody>
+      </p:sp>
+      <p:sp>
+        <p:nvSpPr>
+          <p:cNvPr id="21" name="Text Placeholder 3"/>
+          <p:cNvSpPr>
+            <a:spLocks noGrp="1"/>
+          </p:cNvSpPr>
+          <p:nvPr>
+            <p:ph type="body" sz="half" idx="18"/>
+          </p:nvPr>
+        </p:nvSpPr>
+        <p:spPr>
+          <a:xfrm>
+            <a:off x="688618" y="4873764"/>
+            <a:ext cx="3451582" cy="1344921"/>
+          </a:xfrm>
+        </p:spPr>
+        <p:txBody>
+          <a:bodyPr anchor="t">
+            <a:normAutofit/>
+          </a:bodyPr>
+          <a:lstStyle>
+            <a:lvl1pPr marL="0" indent="0">
+              <a:buNone/>
+              <a:defRPr sz="1400"/>
+            </a:lvl1pPr>
+            <a:lvl2pPr marL="457200" indent="0">
+              <a:buNone/>
+              <a:defRPr sz="1200"/>
+            </a:lvl2pPr>
+            <a:lvl3pPr marL="914400" indent="0">
+              <a:buNone/>
+              <a:defRPr sz="1000"/>
+            </a:lvl3pPr>
+            <a:lvl4pPr marL="1371600" indent="0">
+              <a:buNone/>
+              <a:defRPr sz="900"/>
+            </a:lvl4pPr>
+            <a:lvl5pPr marL="1828800" indent="0">
+              <a:buNone/>
+              <a:defRPr sz="900"/>
+            </a:lvl5pPr>
+            <a:lvl6pPr marL="2286000" indent="0">
+              <a:buNone/>
+              <a:defRPr sz="900"/>
+            </a:lvl6pPr>
+            <a:lvl7pPr marL="2743200" indent="0">
+              <a:buNone/>
+              <a:defRPr sz="900"/>
+            </a:lvl7pPr>
+            <a:lvl8pPr marL="3200400" indent="0">
+              <a:buNone/>
+              <a:defRPr sz="900"/>
+            </a:lvl8pPr>
+            <a:lvl9pPr marL="3657600" indent="0">
+              <a:buNone/>
+              <a:defRPr sz="900"/>
+            </a:lvl9pPr>
+          </a:lstStyle>
+          <a:p>
+            <a:pPr lvl="0"/>
+            <a:r>
+              <a:rPr lang="en-US" smtClean="0"/>
+              <a:t>Edit Master text styles</a:t>
+            </a:r>
+          </a:p>
+        </p:txBody>
+      </p:sp>
+      <p:sp>
+        <p:nvSpPr>
+          <p:cNvPr id="22" name="Text Placeholder 4"/>
+          <p:cNvSpPr>
+            <a:spLocks noGrp="1"/>
+          </p:cNvSpPr>
+          <p:nvPr>
+            <p:ph type="body" sz="quarter" idx="3"/>
+          </p:nvPr>
+        </p:nvSpPr>
+        <p:spPr>
+          <a:xfrm>
+            <a:off x="4374263" y="4191000"/>
+            <a:ext cx="3448935" cy="682765"/>
+          </a:xfrm>
+        </p:spPr>
+        <p:txBody>
+          <a:bodyPr anchor="b">
+            <a:noAutofit/>
+          </a:bodyPr>
+          <a:lstStyle>
+            <a:lvl1pPr marL="0" indent="0">
+              <a:buNone/>
+              <a:defRPr sz="2400" b="0">
+                <a:solidFill>
+                  <a:schemeClr val="tx1"/>
+                </a:solidFill>
+              </a:defRPr>
+            </a:lvl1pPr>
+            <a:lvl2pPr marL="457200" indent="0">
+              <a:buNone/>
+              <a:defRPr sz="2000" b="1"/>
+            </a:lvl2pPr>
+            <a:lvl3pPr marL="914400" indent="0">
+              <a:buNone/>
+              <a:defRPr sz="1800" b="1"/>
+            </a:lvl3pPr>
+            <a:lvl4pPr marL="1371600" indent="0">
+              <a:buNone/>
+              <a:defRPr sz="1600" b="1"/>
+            </a:lvl4pPr>
+            <a:lvl5pPr marL="1828800" indent="0">
+              <a:buNone/>
+              <a:defRPr sz="1600" b="1"/>
+            </a:lvl5pPr>
+            <a:lvl6pPr marL="2286000" indent="0">
+              <a:buNone/>
+              <a:defRPr sz="1600" b="1"/>
+            </a:lvl6pPr>
+            <a:lvl7pPr marL="2743200" indent="0">
+              <a:buNone/>
+              <a:defRPr sz="1600" b="1"/>
+            </a:lvl7pPr>
+            <a:lvl8pPr marL="3200400" indent="0">
+              <a:buNone/>
+              <a:defRPr sz="1600" b="1"/>
+            </a:lvl8pPr>
+            <a:lvl9pPr marL="3657600" indent="0">
+              <a:buNone/>
+              <a:defRPr sz="1600" b="1"/>
+            </a:lvl9pPr>
+          </a:lstStyle>
+          <a:p>
+            <a:pPr lvl="0"/>
+            <a:r>
+              <a:rPr lang="en-US" smtClean="0"/>
+              <a:t>Edit Master text styles</a:t>
+            </a:r>
+          </a:p>
+        </p:txBody>
+      </p:sp>
+      <p:sp>
+        <p:nvSpPr>
+          <p:cNvPr id="23" name="Picture Placeholder 2"/>
+          <p:cNvSpPr>
+            <a:spLocks noGrp="1" noChangeAspect="1"/>
+          </p:cNvSpPr>
+          <p:nvPr>
+            <p:ph type="pic" idx="21"/>
+          </p:nvPr>
+        </p:nvSpPr>
+        <p:spPr>
+          <a:xfrm>
+            <a:off x="4374263" y="2362200"/>
+            <a:ext cx="3448936" cy="1524000"/>
+          </a:xfrm>
+          <a:prstGeom prst="roundRect">
+            <a:avLst>
+              <a:gd name="adj" fmla="val 0"/>
+            </a:avLst>
+          </a:prstGeom>
+          <a:effectLst>
+            <a:outerShdw blurRad="50800" dist="50800" dir="5400000" algn="tl" rotWithShape="0">
+              <a:srgbClr val="000000">
+                <a:alpha val="43000"/>
+              </a:srgbClr>
+            </a:outerShdw>
+          </a:effectLst>
+        </p:spPr>
+        <p:txBody>
+          <a:bodyPr anchor="t">
+            <a:normAutofit/>
+          </a:bodyPr>
+          <a:lstStyle>
+            <a:lvl1pPr marL="0" indent="0" algn="ctr">
+              <a:buNone/>
+              <a:defRPr sz="1600"/>
+            </a:lvl1pPr>
+            <a:lvl2pPr marL="457200" indent="0">
+              <a:buNone/>
+              <a:defRPr sz="1600"/>
+            </a:lvl2pPr>
+            <a:lvl3pPr marL="914400" indent="0">
+              <a:buNone/>
+              <a:defRPr sz="1600"/>
+            </a:lvl3pPr>
+            <a:lvl4pPr marL="1371600" indent="0">
+              <a:buNone/>
+              <a:defRPr sz="1600"/>
+            </a:lvl4pPr>
+            <a:lvl5pPr marL="1828800" indent="0">
+              <a:buNone/>
+              <a:defRPr sz="1600"/>
+            </a:lvl5pPr>
+            <a:lvl6pPr marL="2286000" indent="0">
+              <a:buNone/>
+              <a:defRPr sz="1600"/>
+            </a:lvl6pPr>
+            <a:lvl7pPr marL="2743200" indent="0">
+              <a:buNone/>
+              <a:defRPr sz="1600"/>
+            </a:lvl7pPr>
+            <a:lvl8pPr marL="3200400" indent="0">
+              <a:buNone/>
+              <a:defRPr sz="1600"/>
+            </a:lvl8pPr>
+            <a:lvl9pPr marL="3657600" indent="0">
+              <a:buNone/>
+              <a:defRPr sz="1600"/>
+            </a:lvl9pPr>
+          </a:lstStyle>
+          <a:p>
+            <a:r>
+              <a:rPr lang="en-US" smtClean="0"/>
+              <a:t>Click icon to add picture</a:t>
+            </a:r>
+            <a:endParaRPr lang="en-US" dirty="0"/>
+          </a:p>
+        </p:txBody>
+      </p:sp>
+      <p:sp>
+        <p:nvSpPr>
+          <p:cNvPr id="24" name="Text Placeholder 3"/>
+          <p:cNvSpPr>
+            <a:spLocks noGrp="1"/>
+          </p:cNvSpPr>
+          <p:nvPr>
+            <p:ph type="body" sz="half" idx="19"/>
+          </p:nvPr>
+        </p:nvSpPr>
+        <p:spPr>
+          <a:xfrm>
+            <a:off x="4374264" y="4873763"/>
+            <a:ext cx="3448935" cy="1344921"/>
+          </a:xfrm>
+        </p:spPr>
+        <p:txBody>
+          <a:bodyPr anchor="t">
+            <a:normAutofit/>
+          </a:bodyPr>
+          <a:lstStyle>
+            <a:lvl1pPr marL="0" indent="0">
+              <a:buNone/>
+              <a:defRPr sz="1400"/>
+            </a:lvl1pPr>
+            <a:lvl2pPr marL="457200" indent="0">
+              <a:buNone/>
+              <a:defRPr sz="1200"/>
+            </a:lvl2pPr>
+            <a:lvl3pPr marL="914400" indent="0">
+              <a:buNone/>
+              <a:defRPr sz="1000"/>
+            </a:lvl3pPr>
+            <a:lvl4pPr marL="1371600" indent="0">
+              <a:buNone/>
+              <a:defRPr sz="900"/>
+            </a:lvl4pPr>
+            <a:lvl5pPr marL="1828800" indent="0">
+              <a:buNone/>
+              <a:defRPr sz="900"/>
+            </a:lvl5pPr>
+            <a:lvl6pPr marL="2286000" indent="0">
+              <a:buNone/>
+              <a:defRPr sz="900"/>
+            </a:lvl6pPr>
+            <a:lvl7pPr marL="2743200" indent="0">
+              <a:buNone/>
+              <a:defRPr sz="900"/>
+            </a:lvl7pPr>
+            <a:lvl8pPr marL="3200400" indent="0">
+              <a:buNone/>
+              <a:defRPr sz="900"/>
+            </a:lvl8pPr>
+            <a:lvl9pPr marL="3657600" indent="0">
+              <a:buNone/>
+              <a:defRPr sz="900"/>
+            </a:lvl9pPr>
+          </a:lstStyle>
+          <a:p>
+            <a:pPr lvl="0"/>
+            <a:r>
+              <a:rPr lang="en-US" smtClean="0"/>
+              <a:t>Edit Master text styles</a:t>
+            </a:r>
+          </a:p>
+        </p:txBody>
+      </p:sp>
+      <p:sp>
+        <p:nvSpPr>
+          <p:cNvPr id="25" name="Text Placeholder 4"/>
+          <p:cNvSpPr>
+            <a:spLocks noGrp="1"/>
+          </p:cNvSpPr>
+          <p:nvPr>
+            <p:ph type="body" sz="quarter" idx="13"/>
+          </p:nvPr>
+        </p:nvSpPr>
+        <p:spPr>
+          <a:xfrm>
+            <a:off x="8049731" y="4191000"/>
+            <a:ext cx="3456469" cy="682765"/>
+          </a:xfrm>
+        </p:spPr>
+        <p:txBody>
+          <a:bodyPr anchor="b">
+            <a:noAutofit/>
+          </a:bodyPr>
+          <a:lstStyle>
+            <a:lvl1pPr marL="0" indent="0">
+              <a:buNone/>
+              <a:defRPr sz="2400" b="0">
+                <a:solidFill>
+                  <a:schemeClr val="tx1"/>
+                </a:solidFill>
+              </a:defRPr>
+            </a:lvl1pPr>
+            <a:lvl2pPr marL="457200" indent="0">
+              <a:buNone/>
+              <a:defRPr sz="2000" b="1"/>
+            </a:lvl2pPr>
+            <a:lvl3pPr marL="914400" indent="0">
+              <a:buNone/>
+              <a:defRPr sz="1800" b="1"/>
+            </a:lvl3pPr>
+            <a:lvl4pPr marL="1371600" indent="0">
+              <a:buNone/>
+              <a:defRPr sz="1600" b="1"/>
+            </a:lvl4pPr>
+            <a:lvl5pPr marL="1828800" indent="0">
+              <a:buNone/>
+              <a:defRPr sz="1600" b="1"/>
+            </a:lvl5pPr>
+            <a:lvl6pPr marL="2286000" indent="0">
+              <a:buNone/>
+              <a:defRPr sz="1600" b="1"/>
+            </a:lvl6pPr>
+            <a:lvl7pPr marL="2743200" indent="0">
+              <a:buNone/>
+              <a:defRPr sz="1600" b="1"/>
+            </a:lvl7pPr>
+            <a:lvl8pPr marL="3200400" indent="0">
+              <a:buNone/>
+              <a:defRPr sz="1600" b="1"/>
+            </a:lvl8pPr>
+            <a:lvl9pPr marL="3657600" indent="0">
+              <a:buNone/>
+              <a:defRPr sz="1600" b="1"/>
+            </a:lvl9pPr>
+          </a:lstStyle>
+          <a:p>
+            <a:pPr lvl="0"/>
+            <a:r>
+              <a:rPr lang="en-US" smtClean="0"/>
+              <a:t>Edit Master text styles</a:t>
+            </a:r>
+          </a:p>
+        </p:txBody>
+      </p:sp>
+      <p:sp>
+        <p:nvSpPr>
+          <p:cNvPr id="26" name="Picture Placeholder 2"/>
+          <p:cNvSpPr>
+            <a:spLocks noGrp="1" noChangeAspect="1"/>
+          </p:cNvSpPr>
+          <p:nvPr>
+            <p:ph type="pic" idx="22"/>
+          </p:nvPr>
+        </p:nvSpPr>
+        <p:spPr>
+          <a:xfrm>
+            <a:off x="8049855" y="2362200"/>
+            <a:ext cx="3447878" cy="1524000"/>
+          </a:xfrm>
+          <a:prstGeom prst="roundRect">
+            <a:avLst>
+              <a:gd name="adj" fmla="val 0"/>
+            </a:avLst>
+          </a:prstGeom>
+          <a:effectLst>
+            <a:outerShdw blurRad="50800" dist="50800" dir="5400000" algn="tl" rotWithShape="0">
+              <a:srgbClr val="000000">
+                <a:alpha val="43000"/>
+              </a:srgbClr>
+            </a:outerShdw>
+          </a:effectLst>
+        </p:spPr>
+        <p:txBody>
+          <a:bodyPr anchor="t">
+            <a:normAutofit/>
+          </a:bodyPr>
+          <a:lstStyle>
+            <a:lvl1pPr marL="0" indent="0" algn="ctr">
+              <a:buNone/>
+              <a:defRPr sz="1600"/>
+            </a:lvl1pPr>
+            <a:lvl2pPr marL="457200" indent="0">
+              <a:buNone/>
+              <a:defRPr sz="1600"/>
+            </a:lvl2pPr>
+            <a:lvl3pPr marL="914400" indent="0">
+              <a:buNone/>
+              <a:defRPr sz="1600"/>
+            </a:lvl3pPr>
+            <a:lvl4pPr marL="1371600" indent="0">
+              <a:buNone/>
+              <a:defRPr sz="1600"/>
+            </a:lvl4pPr>
+            <a:lvl5pPr marL="1828800" indent="0">
+              <a:buNone/>
+              <a:defRPr sz="1600"/>
+            </a:lvl5pPr>
+            <a:lvl6pPr marL="2286000" indent="0">
+              <a:buNone/>
+              <a:defRPr sz="1600"/>
+            </a:lvl6pPr>
+            <a:lvl7pPr marL="2743200" indent="0">
+              <a:buNone/>
+              <a:defRPr sz="1600"/>
+            </a:lvl7pPr>
+            <a:lvl8pPr marL="3200400" indent="0">
+              <a:buNone/>
+              <a:defRPr sz="1600"/>
+            </a:lvl8pPr>
+            <a:lvl9pPr marL="3657600" indent="0">
+              <a:buNone/>
+              <a:defRPr sz="1600"/>
+            </a:lvl9pPr>
+          </a:lstStyle>
+          <a:p>
+            <a:r>
+              <a:rPr lang="en-US" smtClean="0"/>
+              <a:t>Click icon to add picture</a:t>
+            </a:r>
+            <a:endParaRPr lang="en-US" dirty="0"/>
+          </a:p>
+        </p:txBody>
+      </p:sp>
+      <p:sp>
+        <p:nvSpPr>
+          <p:cNvPr id="27" name="Text Placeholder 3"/>
+          <p:cNvSpPr>
+            <a:spLocks noGrp="1"/>
+          </p:cNvSpPr>
+          <p:nvPr>
+            <p:ph type="body" sz="half" idx="20"/>
+          </p:nvPr>
+        </p:nvSpPr>
+        <p:spPr>
+          <a:xfrm>
+            <a:off x="8049731" y="4873761"/>
+            <a:ext cx="3452445" cy="1344921"/>
+          </a:xfrm>
+        </p:spPr>
+        <p:txBody>
+          <a:bodyPr anchor="t">
+            <a:normAutofit/>
+          </a:bodyPr>
+          <a:lstStyle>
+            <a:lvl1pPr marL="0" indent="0">
+              <a:buNone/>
+              <a:defRPr sz="1400"/>
+            </a:lvl1pPr>
+            <a:lvl2pPr marL="457200" indent="0">
+              <a:buNone/>
+              <a:defRPr sz="1200"/>
+            </a:lvl2pPr>
+            <a:lvl3pPr marL="914400" indent="0">
+              <a:buNone/>
+              <a:defRPr sz="1000"/>
+            </a:lvl3pPr>
+            <a:lvl4pPr marL="1371600" indent="0">
+              <a:buNone/>
+              <a:defRPr sz="900"/>
+            </a:lvl4pPr>
+            <a:lvl5pPr marL="1828800" indent="0">
+              <a:buNone/>
+              <a:defRPr sz="900"/>
+            </a:lvl5pPr>
+            <a:lvl6pPr marL="2286000" indent="0">
+              <a:buNone/>
+              <a:defRPr sz="900"/>
+            </a:lvl6pPr>
+            <a:lvl7pPr marL="2743200" indent="0">
+              <a:buNone/>
+              <a:defRPr sz="900"/>
+            </a:lvl7pPr>
+            <a:lvl8pPr marL="3200400" indent="0">
+              <a:buNone/>
+              <a:defRPr sz="900"/>
+            </a:lvl8pPr>
+            <a:lvl9pPr marL="3657600" indent="0">
+              <a:buNone/>
+              <a:defRPr sz="900"/>
+            </a:lvl9pPr>
+          </a:lstStyle>
+          <a:p>
+            <a:pPr lvl="0"/>
+            <a:r>
+              <a:rPr lang="en-US" smtClean="0"/>
+              <a:t>Edit Master text styles</a:t>
+            </a:r>
+          </a:p>
+        </p:txBody>
+      </p:sp>
+      <p:sp>
+        <p:nvSpPr>
+          <p:cNvPr id="3" name="Date Placeholder 2"/>
+          <p:cNvSpPr>
+            <a:spLocks noGrp="1"/>
+          </p:cNvSpPr>
+          <p:nvPr>
+            <p:ph type="dt" sz="half" idx="10"/>
+          </p:nvPr>
+        </p:nvSpPr>
+        <p:spPr/>
+        <p:txBody>
+          <a:bodyPr/>
+          <a:lstStyle/>
+          <a:p>
+            <a:fld id="{D90E4620-071E-435E-AAB6-B5C1D075A9EA}" type="datetime1">
+              <a:rPr lang="en-US" smtClean="0"/>
+              <a:t>10/23/2017</a:t>
+            </a:fld>
+            <a:endParaRPr lang="en-US"/>
+          </a:p>
+        </p:txBody>
+      </p:sp>
+      <p:sp>
+        <p:nvSpPr>
+          <p:cNvPr id="4" name="Footer Placeholder 3"/>
+          <p:cNvSpPr>
+            <a:spLocks noGrp="1"/>
+          </p:cNvSpPr>
+          <p:nvPr>
+            <p:ph type="ftr" sz="quarter" idx="11"/>
+          </p:nvPr>
+        </p:nvSpPr>
+        <p:spPr/>
+        <p:txBody>
+          <a:bodyPr/>
+          <a:lstStyle/>
+          <a:p>
+            <a:endParaRPr lang="en-US"/>
+          </a:p>
+        </p:txBody>
+      </p:sp>
+      <p:sp>
+        <p:nvSpPr>
+          <p:cNvPr id="5" name="Slide Number Placeholder 4"/>
+          <p:cNvSpPr>
+            <a:spLocks noGrp="1"/>
+          </p:cNvSpPr>
+          <p:nvPr>
+            <p:ph type="sldNum" sz="quarter" idx="12"/>
+          </p:nvPr>
+        </p:nvSpPr>
+        <p:spPr/>
+        <p:txBody>
+          <a:bodyPr/>
+          <a:lstStyle/>
+          <a:p>
+            <a:fld id="{6DA7AA4B-8849-44DE-A3E8-A263F985E91B}" type="slidenum">
+              <a:rPr lang="en-US" smtClean="0"/>
+              <a:t>‹#›</a:t>
+            </a:fld>
+            <a:endParaRPr lang="en-US"/>
+          </a:p>
+        </p:txBody>
+      </p:sp>
+    </p:spTree>
+    <p:extLst>
+      <p:ext uri="{BB962C8B-B14F-4D97-AF65-F5344CB8AC3E}">
+        <p14:creationId xmlns:p14="http://schemas.microsoft.com/office/powerpoint/2010/main" val="2375208298"/>
+      </p:ext>
+    </p:extLst>
+  </p:cSld>
+  <p:clrMapOvr>
+    <a:masterClrMapping/>
+  </p:clrMapOvr>
+</p:sldLayout>
+</file>
+
+<file path=ppt/slideLayouts/slideLayout16.xml><?xml version="1.0" encoding="utf-8"?>
 <p:sldLayout xmlns:a="http://schemas.openxmlformats.org/drawingml/2006/main" xmlns:r="http://schemas.openxmlformats.org/officeDocument/2006/relationships" xmlns:p="http://schemas.openxmlformats.org/presentationml/2006/main" type="vertTx" preserve="1">
   <p:cSld name="Title and Vertical Text">
     <p:spTree>
@@ -340,7 +3339,7 @@
               <a:rPr lang="en-US" smtClean="0"/>
               <a:t>Click to edit Master title style</a:t>
             </a:r>
-            <a:endParaRPr lang="en-US"/>
+            <a:endParaRPr lang="en-US" dirty="0"/>
           </a:p>
         </p:txBody>
       </p:sp>
@@ -354,64 +3353,69 @@
             <p:ph type="body" orient="vert" idx="1"/>
           </p:nvPr>
         </p:nvSpPr>
+        <p:spPr>
+          <a:xfrm>
+            <a:off x="685800" y="2194559"/>
+            <a:ext cx="10820400" cy="4024125"/>
+          </a:xfrm>
+        </p:spPr>
+        <p:txBody>
+          <a:bodyPr vert="eaVert"/>
+          <a:lstStyle/>
+          <a:p>
+            <a:pPr lvl="0"/>
+            <a:r>
+              <a:rPr lang="en-US" smtClean="0"/>
+              <a:t>Edit Master text styles</a:t>
+            </a:r>
+          </a:p>
+          <a:p>
+            <a:pPr lvl="1"/>
+            <a:r>
+              <a:rPr lang="en-US" smtClean="0"/>
+              <a:t>Second level</a:t>
+            </a:r>
+          </a:p>
+          <a:p>
+            <a:pPr lvl="2"/>
+            <a:r>
+              <a:rPr lang="en-US" smtClean="0"/>
+              <a:t>Third level</a:t>
+            </a:r>
+          </a:p>
+          <a:p>
+            <a:pPr lvl="3"/>
+            <a:r>
+              <a:rPr lang="en-US" smtClean="0"/>
+              <a:t>Fourth level</a:t>
+            </a:r>
+          </a:p>
+          <a:p>
+            <a:pPr lvl="4"/>
+            <a:r>
+              <a:rPr lang="en-US" smtClean="0"/>
+              <a:t>Fifth level</a:t>
+            </a:r>
+            <a:endParaRPr lang="en-US" dirty="0"/>
+          </a:p>
+        </p:txBody>
+      </p:sp>
+      <p:sp>
+        <p:nvSpPr>
+          <p:cNvPr id="4" name="Date Placeholder 3"/>
+          <p:cNvSpPr>
+            <a:spLocks noGrp="1"/>
+          </p:cNvSpPr>
+          <p:nvPr>
+            <p:ph type="dt" sz="half" idx="10"/>
+          </p:nvPr>
+        </p:nvSpPr>
         <p:spPr/>
         <p:txBody>
-          <a:bodyPr vert="eaVert"/>
-          <a:lstStyle/>
-          <a:p>
-            <a:pPr lvl="0"/>
-            <a:r>
-              <a:rPr lang="en-US" smtClean="0"/>
-              <a:t>Edit Master text styles</a:t>
-            </a:r>
-          </a:p>
-          <a:p>
-            <a:pPr lvl="1"/>
-            <a:r>
-              <a:rPr lang="en-US" smtClean="0"/>
-              <a:t>Second level</a:t>
-            </a:r>
-          </a:p>
-          <a:p>
-            <a:pPr lvl="2"/>
-            <a:r>
-              <a:rPr lang="en-US" smtClean="0"/>
-              <a:t>Third level</a:t>
-            </a:r>
-          </a:p>
-          <a:p>
-            <a:pPr lvl="3"/>
-            <a:r>
-              <a:rPr lang="en-US" smtClean="0"/>
-              <a:t>Fourth level</a:t>
-            </a:r>
-          </a:p>
-          <a:p>
-            <a:pPr lvl="4"/>
-            <a:r>
-              <a:rPr lang="en-US" smtClean="0"/>
-              <a:t>Fifth level</a:t>
-            </a:r>
-            <a:endParaRPr lang="en-US"/>
-          </a:p>
-        </p:txBody>
-      </p:sp>
-      <p:sp>
-        <p:nvSpPr>
-          <p:cNvPr id="4" name="Date Placeholder 3"/>
-          <p:cNvSpPr>
-            <a:spLocks noGrp="1"/>
-          </p:cNvSpPr>
-          <p:nvPr>
-            <p:ph type="dt" sz="half" idx="10"/>
-          </p:nvPr>
-        </p:nvSpPr>
-        <p:spPr/>
-        <p:txBody>
-          <a:bodyPr/>
-          <a:lstStyle/>
-          <a:p>
-            <a:fld id="{822E1C28-B949-4155-BDD8-86A4AEEBA49D}" type="datetimeFigureOut">
+          <a:bodyPr/>
+          <a:lstStyle/>
+          <a:p>
+            <a:fld id="{C6B6E5A8-DCD0-4EF9-8475-F82CD105FD59}" type="datetime1">
               <a:rPr lang="en-US" smtClean="0"/>
               <a:t>10/23/2017</a:t>
             </a:fld>
@@ -464,7 +3468,7 @@
     </p:spTree>
     <p:extLst>
       <p:ext uri="{BB962C8B-B14F-4D97-AF65-F5344CB8AC3E}">
-        <p14:creationId xmlns:p14="http://schemas.microsoft.com/office/powerpoint/2010/main" val="3554911977"/>
+        <p14:creationId xmlns:p14="http://schemas.microsoft.com/office/powerpoint/2010/main" val="1382307644"/>
       </p:ext>
     </p:extLst>
   </p:cSld>
@@ -474,8 +3478,8 @@
 </p:sldLayout>
 </file>
 
-<file path=ppt/slideLayouts/slideLayout11.xml><?xml version="1.0" encoding="utf-8"?>
-<p:sldLayout xmlns:a="http://schemas.openxmlformats.org/drawingml/2006/main" xmlns:r="http://schemas.openxmlformats.org/officeDocument/2006/relationships" xmlns:p="http://schemas.openxmlformats.org/presentationml/2006/main" type="vertTitleAndTx" preserve="1">
+<file path=ppt/slideLayouts/slideLayout17.xml><?xml version="1.0" encoding="utf-8"?>
+<p:sldLayout xmlns:a="http://schemas.openxmlformats.org/drawingml/2006/main" xmlns:r="http://schemas.openxmlformats.org/officeDocument/2006/relationships" xmlns:p="http://schemas.openxmlformats.org/presentationml/2006/main" showMasterSp="0" type="vertTitleAndTx" preserve="1">
   <p:cSld name="Vertical Title and Text">
     <p:spTree>
       <p:nvGrpSpPr>
@@ -491,6 +3495,36 @@
           <a:chExt cx="0" cy="0"/>
         </a:xfrm>
       </p:grpSpPr>
+      <p:pic>
+        <p:nvPicPr>
+          <p:cNvPr id="8" name="Picture 7" descr="C0-HD-BTM.png"/>
+          <p:cNvPicPr>
+            <a:picLocks noChangeAspect="1"/>
+          </p:cNvPicPr>
+          <p:nvPr/>
+        </p:nvPicPr>
+        <p:blipFill>
+          <a:blip r:embed="rId2">
+            <a:extLst>
+              <a:ext uri="{28A0092B-C50C-407E-A947-70E740481C1C}">
+                <a14:useLocalDpi xmlns:a14="http://schemas.microsoft.com/office/drawing/2010/main" val="0"/>
+              </a:ext>
+            </a:extLst>
+          </a:blip>
+          <a:stretch>
+            <a:fillRect/>
+          </a:stretch>
+        </p:blipFill>
+        <p:spPr>
+          <a:xfrm>
+            <a:off x="0" y="4375150"/>
+            <a:ext cx="12192000" cy="2482850"/>
+          </a:xfrm>
+          <a:prstGeom prst="rect">
+            <a:avLst/>
+          </a:prstGeom>
+        </p:spPr>
+      </p:pic>
       <p:sp>
         <p:nvSpPr>
           <p:cNvPr id="2" name="Vertical Title 1"/>
@@ -503,19 +3537,23 @@
         </p:nvSpPr>
         <p:spPr>
           <a:xfrm>
-            <a:off x="8724900" y="365125"/>
-            <a:ext cx="2628900" cy="5811838"/>
+            <a:off x="9448800" y="745066"/>
+            <a:ext cx="2057400" cy="3903133"/>
           </a:xfrm>
         </p:spPr>
         <p:txBody>
           <a:bodyPr vert="eaVert"/>
-          <a:lstStyle/>
+          <a:lstStyle>
+            <a:lvl1pPr algn="l">
+              <a:defRPr/>
+            </a:lvl1pPr>
+          </a:lstStyle>
           <a:p>
             <a:r>
               <a:rPr lang="en-US" smtClean="0"/>
               <a:t>Click to edit Master title style</a:t>
             </a:r>
-            <a:endParaRPr lang="en-US"/>
+            <a:endParaRPr lang="en-US" dirty="0"/>
           </a:p>
         </p:txBody>
       </p:sp>
@@ -531,8 +3569,8 @@
         </p:nvSpPr>
         <p:spPr>
           <a:xfrm>
-            <a:off x="838200" y="365125"/>
-            <a:ext cx="7734300" cy="5811838"/>
+            <a:off x="1024466" y="745067"/>
+            <a:ext cx="8204201" cy="3903133"/>
           </a:xfrm>
         </p:spPr>
         <p:txBody>
@@ -572,7 +3610,7 @@
               <a:rPr lang="en-US" smtClean="0"/>
               <a:t>Fifth level</a:t>
             </a:r>
-            <a:endParaRPr lang="en-US"/>
+            <a:endParaRPr lang="en-US" dirty="0"/>
           </a:p>
         </p:txBody>
       </p:sp>
@@ -586,12 +3624,21 @@
             <p:ph type="dt" sz="half" idx="10"/>
           </p:nvPr>
         </p:nvSpPr>
-        <p:spPr/>
-        <p:txBody>
-          <a:bodyPr/>
-          <a:lstStyle/>
-          <a:p>
-            <a:fld id="{822E1C28-B949-4155-BDD8-86A4AEEBA49D}" type="datetimeFigureOut">
+        <p:spPr>
+          <a:xfrm>
+            <a:off x="7814452" y="379941"/>
+            <a:ext cx="2910840" cy="365125"/>
+          </a:xfrm>
+        </p:spPr>
+        <p:txBody>
+          <a:bodyPr/>
+          <a:lstStyle>
+            <a:lvl1pPr algn="r">
+              <a:defRPr/>
+            </a:lvl1pPr>
+          </a:lstStyle>
+          <a:p>
+            <a:fld id="{F926C3AF-CED8-4BEF-ABB8-C54E21CFBAEC}" type="datetime1">
               <a:rPr lang="en-US" smtClean="0"/>
               <a:t>10/23/2017</a:t>
             </a:fld>
@@ -609,7 +3656,12 @@
             <p:ph type="ftr" sz="quarter" idx="11"/>
           </p:nvPr>
         </p:nvSpPr>
-        <p:spPr/>
+        <p:spPr>
+          <a:xfrm>
+            <a:off x="685800" y="381000"/>
+            <a:ext cx="6991492" cy="365125"/>
+          </a:xfrm>
+        </p:spPr>
         <p:txBody>
           <a:bodyPr/>
           <a:lstStyle/>
@@ -628,7 +3680,12 @@
             <p:ph type="sldNum" sz="quarter" idx="12"/>
           </p:nvPr>
         </p:nvSpPr>
-        <p:spPr/>
+        <p:spPr>
+          <a:xfrm>
+            <a:off x="10862452" y="381000"/>
+            <a:ext cx="643748" cy="365125"/>
+          </a:xfrm>
+        </p:spPr>
         <p:txBody>
           <a:bodyPr/>
           <a:lstStyle/>
@@ -644,7 +3701,7 @@
     </p:spTree>
     <p:extLst>
       <p:ext uri="{BB962C8B-B14F-4D97-AF65-F5344CB8AC3E}">
-        <p14:creationId xmlns:p14="http://schemas.microsoft.com/office/powerpoint/2010/main" val="1888077104"/>
+        <p14:creationId xmlns:p14="http://schemas.microsoft.com/office/powerpoint/2010/main" val="1852942736"/>
       </p:ext>
     </p:extLst>
   </p:cSld>
@@ -690,7 +3747,7 @@
               <a:rPr lang="en-US" smtClean="0"/>
               <a:t>Click to edit Master title style</a:t>
             </a:r>
-            <a:endParaRPr lang="en-US"/>
+            <a:endParaRPr lang="en-US" dirty="0"/>
           </a:p>
         </p:txBody>
       </p:sp>
@@ -742,7 +3799,7 @@
               <a:rPr lang="en-US" smtClean="0"/>
               <a:t>Fifth level</a:t>
             </a:r>
-            <a:endParaRPr lang="en-US"/>
+            <a:endParaRPr lang="en-US" dirty="0"/>
           </a:p>
         </p:txBody>
       </p:sp>
@@ -761,7 +3818,7 @@
           <a:bodyPr/>
           <a:lstStyle/>
           <a:p>
-            <a:fld id="{822E1C28-B949-4155-BDD8-86A4AEEBA49D}" type="datetimeFigureOut">
+            <a:fld id="{223F4B9D-A727-4FBE-8BA7-6B65500CB680}" type="datetime1">
               <a:rPr lang="en-US" smtClean="0"/>
               <a:t>10/23/2017</a:t>
             </a:fld>
@@ -814,7 +3871,7 @@
     </p:spTree>
     <p:extLst>
       <p:ext uri="{BB962C8B-B14F-4D97-AF65-F5344CB8AC3E}">
-        <p14:creationId xmlns:p14="http://schemas.microsoft.com/office/powerpoint/2010/main" val="2652375603"/>
+        <p14:creationId xmlns:p14="http://schemas.microsoft.com/office/powerpoint/2010/main" val="2039400817"/>
       </p:ext>
     </p:extLst>
   </p:cSld>
@@ -825,7 +3882,7 @@
 </file>
 
 <file path=ppt/slideLayouts/slideLayout3.xml><?xml version="1.0" encoding="utf-8"?>
-<p:sldLayout xmlns:a="http://schemas.openxmlformats.org/drawingml/2006/main" xmlns:r="http://schemas.openxmlformats.org/officeDocument/2006/relationships" xmlns:p="http://schemas.openxmlformats.org/presentationml/2006/main" type="secHead" preserve="1">
+<p:sldLayout xmlns:a="http://schemas.openxmlformats.org/drawingml/2006/main" xmlns:r="http://schemas.openxmlformats.org/officeDocument/2006/relationships" xmlns:p="http://schemas.openxmlformats.org/presentationml/2006/main" showMasterSp="0" type="secHead" preserve="1">
   <p:cSld name="Section Header">
     <p:spTree>
       <p:nvGrpSpPr>
@@ -841,6 +3898,36 @@
           <a:chExt cx="0" cy="0"/>
         </a:xfrm>
       </p:grpSpPr>
+      <p:pic>
+        <p:nvPicPr>
+          <p:cNvPr id="9" name="Picture 8" descr="C0-HD-BTM.png"/>
+          <p:cNvPicPr>
+            <a:picLocks noChangeAspect="1"/>
+          </p:cNvPicPr>
+          <p:nvPr/>
+        </p:nvPicPr>
+        <p:blipFill>
+          <a:blip r:embed="rId2">
+            <a:extLst>
+              <a:ext uri="{28A0092B-C50C-407E-A947-70E740481C1C}">
+                <a14:useLocalDpi xmlns:a14="http://schemas.microsoft.com/office/drawing/2010/main" val="0"/>
+              </a:ext>
+            </a:extLst>
+          </a:blip>
+          <a:stretch>
+            <a:fillRect/>
+          </a:stretch>
+        </p:blipFill>
+        <p:spPr>
+          <a:xfrm>
+            <a:off x="0" y="4375150"/>
+            <a:ext cx="12192000" cy="2482850"/>
+          </a:xfrm>
+          <a:prstGeom prst="rect">
+            <a:avLst/>
+          </a:prstGeom>
+        </p:spPr>
+      </p:pic>
       <p:sp>
         <p:nvSpPr>
           <p:cNvPr id="2" name="Title 1"/>
@@ -853,15 +3940,17 @@
         </p:nvSpPr>
         <p:spPr>
           <a:xfrm>
-            <a:off x="831850" y="1709738"/>
-            <a:ext cx="10515600" cy="2852737"/>
-          </a:xfrm>
-        </p:spPr>
-        <p:txBody>
-          <a:bodyPr anchor="b"/>
+            <a:off x="685800" y="753533"/>
+            <a:ext cx="10820399" cy="2801935"/>
+          </a:xfrm>
+        </p:spPr>
+        <p:txBody>
+          <a:bodyPr anchor="b">
+            <a:normAutofit/>
+          </a:bodyPr>
           <a:lstStyle>
-            <a:lvl1pPr>
-              <a:defRPr sz="6000"/>
+            <a:lvl1pPr algn="r">
+              <a:defRPr sz="4000"/>
             </a:lvl1pPr>
           </a:lstStyle>
           <a:p>
@@ -869,7 +3958,7 @@
               <a:rPr lang="en-US" smtClean="0"/>
               <a:t>Click to edit Master title style</a:t>
             </a:r>
-            <a:endParaRPr lang="en-US"/>
+            <a:endParaRPr lang="en-US" dirty="0"/>
           </a:p>
         </p:txBody>
       </p:sp>
@@ -885,16 +3974,18 @@
         </p:nvSpPr>
         <p:spPr>
           <a:xfrm>
-            <a:off x="831850" y="4589463"/>
-            <a:ext cx="10515600" cy="1500187"/>
-          </a:xfrm>
-        </p:spPr>
-        <p:txBody>
-          <a:bodyPr/>
+            <a:off x="1024467" y="3641725"/>
+            <a:ext cx="10490200" cy="955675"/>
+          </a:xfrm>
+        </p:spPr>
+        <p:txBody>
+          <a:bodyPr>
+            <a:normAutofit/>
+          </a:bodyPr>
           <a:lstStyle>
-            <a:lvl1pPr marL="0" indent="0">
-              <a:buNone/>
-              <a:defRPr sz="2400">
+            <a:lvl1pPr marL="0" indent="0" algn="r">
+              <a:buNone/>
+              <a:defRPr sz="2200">
                 <a:solidFill>
                   <a:schemeClr val="tx1">
                     <a:tint val="75000"/>
@@ -1002,12 +4093,21 @@
             <p:ph type="dt" sz="half" idx="10"/>
           </p:nvPr>
         </p:nvSpPr>
-        <p:spPr/>
-        <p:txBody>
-          <a:bodyPr/>
-          <a:lstStyle/>
-          <a:p>
-            <a:fld id="{822E1C28-B949-4155-BDD8-86A4AEEBA49D}" type="datetimeFigureOut">
+        <p:spPr>
+          <a:xfrm>
+            <a:off x="7814452" y="381000"/>
+            <a:ext cx="2910840" cy="365125"/>
+          </a:xfrm>
+        </p:spPr>
+        <p:txBody>
+          <a:bodyPr/>
+          <a:lstStyle>
+            <a:lvl1pPr algn="r">
+              <a:defRPr/>
+            </a:lvl1pPr>
+          </a:lstStyle>
+          <a:p>
+            <a:fld id="{736AA06F-D7F8-4728-868E-C6A5EFC153CD}" type="datetime1">
               <a:rPr lang="en-US" smtClean="0"/>
               <a:t>10/23/2017</a:t>
             </a:fld>
@@ -1025,7 +4125,12 @@
             <p:ph type="ftr" sz="quarter" idx="11"/>
           </p:nvPr>
         </p:nvSpPr>
-        <p:spPr/>
+        <p:spPr>
+          <a:xfrm>
+            <a:off x="685800" y="381001"/>
+            <a:ext cx="6991492" cy="364065"/>
+          </a:xfrm>
+        </p:spPr>
         <p:txBody>
           <a:bodyPr/>
           <a:lstStyle/>
@@ -1044,7 +4149,12 @@
             <p:ph type="sldNum" sz="quarter" idx="12"/>
           </p:nvPr>
         </p:nvSpPr>
-        <p:spPr/>
+        <p:spPr>
+          <a:xfrm>
+            <a:off x="10862452" y="381000"/>
+            <a:ext cx="643748" cy="365125"/>
+          </a:xfrm>
+        </p:spPr>
         <p:txBody>
           <a:bodyPr/>
           <a:lstStyle/>
@@ -1060,7 +4170,7 @@
     </p:spTree>
     <p:extLst>
       <p:ext uri="{BB962C8B-B14F-4D97-AF65-F5344CB8AC3E}">
-        <p14:creationId xmlns:p14="http://schemas.microsoft.com/office/powerpoint/2010/main" val="3931004534"/>
+        <p14:creationId xmlns:p14="http://schemas.microsoft.com/office/powerpoint/2010/main" val="381955802"/>
       </p:ext>
     </p:extLst>
   </p:cSld>
@@ -1106,7 +4216,7 @@
               <a:rPr lang="en-US" smtClean="0"/>
               <a:t>Click to edit Master title style</a:t>
             </a:r>
-            <a:endParaRPr lang="en-US"/>
+            <a:endParaRPr lang="en-US" dirty="0"/>
           </a:p>
         </p:txBody>
       </p:sp>
@@ -1122,8 +4232,8 @@
         </p:nvSpPr>
         <p:spPr>
           <a:xfrm>
-            <a:off x="838200" y="1825625"/>
-            <a:ext cx="5181600" cy="4351338"/>
+            <a:off x="685800" y="2194559"/>
+            <a:ext cx="5334000" cy="4024125"/>
           </a:xfrm>
         </p:spPr>
         <p:txBody>
@@ -1163,7 +4273,7 @@
               <a:rPr lang="en-US" smtClean="0"/>
               <a:t>Fifth level</a:t>
             </a:r>
-            <a:endParaRPr lang="en-US"/>
+            <a:endParaRPr lang="en-US" dirty="0"/>
           </a:p>
         </p:txBody>
       </p:sp>
@@ -1179,8 +4289,8 @@
         </p:nvSpPr>
         <p:spPr>
           <a:xfrm>
-            <a:off x="6172200" y="1825625"/>
-            <a:ext cx="5181600" cy="4351338"/>
+            <a:off x="6172200" y="2194559"/>
+            <a:ext cx="5334000" cy="4024125"/>
           </a:xfrm>
         </p:spPr>
         <p:txBody>
@@ -1220,7 +4330,7 @@
               <a:rPr lang="en-US" smtClean="0"/>
               <a:t>Fifth level</a:t>
             </a:r>
-            <a:endParaRPr lang="en-US"/>
+            <a:endParaRPr lang="en-US" dirty="0"/>
           </a:p>
         </p:txBody>
       </p:sp>
@@ -1239,7 +4349,7 @@
           <a:bodyPr/>
           <a:lstStyle/>
           <a:p>
-            <a:fld id="{822E1C28-B949-4155-BDD8-86A4AEEBA49D}" type="datetimeFigureOut">
+            <a:fld id="{98C49CF7-4D8F-4D3F-94F9-7302CB48BDE9}" type="datetime1">
               <a:rPr lang="en-US" smtClean="0"/>
               <a:t>10/23/2017</a:t>
             </a:fld>
@@ -1292,7 +4402,7 @@
     </p:spTree>
     <p:extLst>
       <p:ext uri="{BB962C8B-B14F-4D97-AF65-F5344CB8AC3E}">
-        <p14:creationId xmlns:p14="http://schemas.microsoft.com/office/powerpoint/2010/main" val="2767327838"/>
+        <p14:creationId xmlns:p14="http://schemas.microsoft.com/office/powerpoint/2010/main" val="3207114709"/>
       </p:ext>
     </p:extLst>
   </p:cSld>
@@ -1331,8 +4441,8 @@
         </p:nvSpPr>
         <p:spPr>
           <a:xfrm>
-            <a:off x="839788" y="365125"/>
-            <a:ext cx="10515600" cy="1325563"/>
+            <a:off x="2895600" y="762000"/>
+            <a:ext cx="8610600" cy="1295400"/>
           </a:xfrm>
         </p:spPr>
         <p:txBody>
@@ -1343,7 +4453,7 @@
               <a:rPr lang="en-US" smtClean="0"/>
               <a:t>Click to edit Master title style</a:t>
             </a:r>
-            <a:endParaRPr lang="en-US"/>
+            <a:endParaRPr lang="en-US" dirty="0"/>
           </a:p>
         </p:txBody>
       </p:sp>
@@ -1359,16 +4469,22 @@
         </p:nvSpPr>
         <p:spPr>
           <a:xfrm>
-            <a:off x="839788" y="1681163"/>
-            <a:ext cx="5157787" cy="823912"/>
-          </a:xfrm>
-        </p:spPr>
-        <p:txBody>
-          <a:bodyPr anchor="b"/>
+            <a:off x="914409" y="2183802"/>
+            <a:ext cx="5079991" cy="823912"/>
+          </a:xfrm>
+        </p:spPr>
+        <p:txBody>
+          <a:bodyPr anchor="b">
+            <a:normAutofit/>
+          </a:bodyPr>
           <a:lstStyle>
             <a:lvl1pPr marL="0" indent="0">
               <a:buNone/>
-              <a:defRPr sz="2400" b="1"/>
+              <a:defRPr sz="2800" b="0">
+                <a:solidFill>
+                  <a:schemeClr val="tx1"/>
+                </a:solidFill>
+              </a:defRPr>
             </a:lvl1pPr>
             <a:lvl2pPr marL="457200" indent="0">
               <a:buNone/>
@@ -1424,8 +4540,8 @@
         </p:nvSpPr>
         <p:spPr>
           <a:xfrm>
-            <a:off x="839788" y="2505075"/>
-            <a:ext cx="5157787" cy="3684588"/>
+            <a:off x="685800" y="3132666"/>
+            <a:ext cx="5311775" cy="3086019"/>
           </a:xfrm>
         </p:spPr>
         <p:txBody>
@@ -1465,7 +4581,7 @@
               <a:rPr lang="en-US" smtClean="0"/>
               <a:t>Fifth level</a:t>
             </a:r>
-            <a:endParaRPr lang="en-US"/>
+            <a:endParaRPr lang="en-US" dirty="0"/>
           </a:p>
         </p:txBody>
       </p:sp>
@@ -1481,16 +4597,22 @@
         </p:nvSpPr>
         <p:spPr>
           <a:xfrm>
-            <a:off x="6172200" y="1681163"/>
-            <a:ext cx="5183188" cy="823912"/>
-          </a:xfrm>
-        </p:spPr>
-        <p:txBody>
-          <a:bodyPr anchor="b"/>
+            <a:off x="6400800" y="2183802"/>
+            <a:ext cx="5105400" cy="823912"/>
+          </a:xfrm>
+        </p:spPr>
+        <p:txBody>
+          <a:bodyPr anchor="b">
+            <a:normAutofit/>
+          </a:bodyPr>
           <a:lstStyle>
             <a:lvl1pPr marL="0" indent="0">
               <a:buNone/>
-              <a:defRPr sz="2400" b="1"/>
+              <a:defRPr sz="2800" b="0">
+                <a:solidFill>
+                  <a:schemeClr val="tx1"/>
+                </a:solidFill>
+              </a:defRPr>
             </a:lvl1pPr>
             <a:lvl2pPr marL="457200" indent="0">
               <a:buNone/>
@@ -1546,8 +4668,8 @@
         </p:nvSpPr>
         <p:spPr>
           <a:xfrm>
-            <a:off x="6172200" y="2505075"/>
-            <a:ext cx="5183188" cy="3684588"/>
+            <a:off x="6172200" y="3132666"/>
+            <a:ext cx="5334000" cy="3086019"/>
           </a:xfrm>
         </p:spPr>
         <p:txBody>
@@ -1587,7 +4709,7 @@
               <a:rPr lang="en-US" smtClean="0"/>
               <a:t>Fifth level</a:t>
             </a:r>
-            <a:endParaRPr lang="en-US"/>
+            <a:endParaRPr lang="en-US" dirty="0"/>
           </a:p>
         </p:txBody>
       </p:sp>
@@ -1606,7 +4728,7 @@
           <a:bodyPr/>
           <a:lstStyle/>
           <a:p>
-            <a:fld id="{822E1C28-B949-4155-BDD8-86A4AEEBA49D}" type="datetimeFigureOut">
+            <a:fld id="{8048A171-220E-44B9-90E3-FD60502586C8}" type="datetime1">
               <a:rPr lang="en-US" smtClean="0"/>
               <a:t>10/23/2017</a:t>
             </a:fld>
@@ -1659,7 +4781,7 @@
     </p:spTree>
     <p:extLst>
       <p:ext uri="{BB962C8B-B14F-4D97-AF65-F5344CB8AC3E}">
-        <p14:creationId xmlns:p14="http://schemas.microsoft.com/office/powerpoint/2010/main" val="365169850"/>
+        <p14:creationId xmlns:p14="http://schemas.microsoft.com/office/powerpoint/2010/main" val="1565363735"/>
       </p:ext>
     </p:extLst>
   </p:cSld>
@@ -1705,7 +4827,7 @@
               <a:rPr lang="en-US" smtClean="0"/>
               <a:t>Click to edit Master title style</a:t>
             </a:r>
-            <a:endParaRPr lang="en-US"/>
+            <a:endParaRPr lang="en-US" dirty="0"/>
           </a:p>
         </p:txBody>
       </p:sp>
@@ -1724,7 +4846,7 @@
           <a:bodyPr/>
           <a:lstStyle/>
           <a:p>
-            <a:fld id="{822E1C28-B949-4155-BDD8-86A4AEEBA49D}" type="datetimeFigureOut">
+            <a:fld id="{2A51B499-97BD-4415-8FC1-9FC28401EDF8}" type="datetime1">
               <a:rPr lang="en-US" smtClean="0"/>
               <a:t>10/23/2017</a:t>
             </a:fld>
@@ -1777,7 +4899,7 @@
     </p:spTree>
     <p:extLst>
       <p:ext uri="{BB962C8B-B14F-4D97-AF65-F5344CB8AC3E}">
-        <p14:creationId xmlns:p14="http://schemas.microsoft.com/office/powerpoint/2010/main" val="1389776242"/>
+        <p14:creationId xmlns:p14="http://schemas.microsoft.com/office/powerpoint/2010/main" val="1013451812"/>
       </p:ext>
     </p:extLst>
   </p:cSld>
@@ -1819,7 +4941,7 @@
           <a:bodyPr/>
           <a:lstStyle/>
           <a:p>
-            <a:fld id="{822E1C28-B949-4155-BDD8-86A4AEEBA49D}" type="datetimeFigureOut">
+            <a:fld id="{1924B727-D5D4-46A4-B25B-CA993BDAC4AB}" type="datetime1">
               <a:rPr lang="en-US" smtClean="0"/>
               <a:t>10/23/2017</a:t>
             </a:fld>
@@ -1872,7 +4994,7 @@
     </p:spTree>
     <p:extLst>
       <p:ext uri="{BB962C8B-B14F-4D97-AF65-F5344CB8AC3E}">
-        <p14:creationId xmlns:p14="http://schemas.microsoft.com/office/powerpoint/2010/main" val="3207025750"/>
+        <p14:creationId xmlns:p14="http://schemas.microsoft.com/office/powerpoint/2010/main" val="3765799219"/>
       </p:ext>
     </p:extLst>
   </p:cSld>
@@ -1911,14 +5033,14 @@
         </p:nvSpPr>
         <p:spPr>
           <a:xfrm>
-            <a:off x="839788" y="457200"/>
-            <a:ext cx="3932237" cy="1600200"/>
+            <a:off x="685800" y="1524000"/>
+            <a:ext cx="4114800" cy="1600200"/>
           </a:xfrm>
         </p:spPr>
         <p:txBody>
           <a:bodyPr anchor="b"/>
           <a:lstStyle>
-            <a:lvl1pPr>
+            <a:lvl1pPr algn="l">
               <a:defRPr sz="3200"/>
             </a:lvl1pPr>
           </a:lstStyle>
@@ -1927,7 +5049,7 @@
               <a:rPr lang="en-US" smtClean="0"/>
               <a:t>Click to edit Master title style</a:t>
             </a:r>
-            <a:endParaRPr lang="en-US"/>
+            <a:endParaRPr lang="en-US" dirty="0"/>
           </a:p>
         </p:txBody>
       </p:sp>
@@ -1943,41 +5065,13 @@
         </p:nvSpPr>
         <p:spPr>
           <a:xfrm>
-            <a:off x="5183188" y="987425"/>
-            <a:ext cx="6172200" cy="4873625"/>
-          </a:xfrm>
-        </p:spPr>
-        <p:txBody>
-          <a:bodyPr/>
-          <a:lstStyle>
-            <a:lvl1pPr>
-              <a:defRPr sz="3200"/>
-            </a:lvl1pPr>
-            <a:lvl2pPr>
-              <a:defRPr sz="2800"/>
-            </a:lvl2pPr>
-            <a:lvl3pPr>
-              <a:defRPr sz="2400"/>
-            </a:lvl3pPr>
-            <a:lvl4pPr>
-              <a:defRPr sz="2000"/>
-            </a:lvl4pPr>
-            <a:lvl5pPr>
-              <a:defRPr sz="2000"/>
-            </a:lvl5pPr>
-            <a:lvl6pPr>
-              <a:defRPr sz="2000"/>
-            </a:lvl6pPr>
-            <a:lvl7pPr>
-              <a:defRPr sz="2000"/>
-            </a:lvl7pPr>
-            <a:lvl8pPr>
-              <a:defRPr sz="2000"/>
-            </a:lvl8pPr>
-            <a:lvl9pPr>
-              <a:defRPr sz="2000"/>
-            </a:lvl9pPr>
-          </a:lstStyle>
+            <a:off x="4995582" y="746759"/>
+            <a:ext cx="6510618" cy="5471925"/>
+          </a:xfrm>
+        </p:spPr>
+        <p:txBody>
+          <a:bodyPr anchor="ctr"/>
+          <a:lstStyle/>
           <a:p>
             <a:pPr lvl="0"/>
             <a:r>
@@ -2012,7 +5106,7 @@
               <a:rPr lang="en-US" smtClean="0"/>
               <a:t>Fifth level</a:t>
             </a:r>
-            <a:endParaRPr lang="en-US"/>
+            <a:endParaRPr lang="en-US" dirty="0"/>
           </a:p>
         </p:txBody>
       </p:sp>
@@ -2028,8 +5122,8 @@
         </p:nvSpPr>
         <p:spPr>
           <a:xfrm>
-            <a:off x="839788" y="2057400"/>
-            <a:ext cx="3932237" cy="3811588"/>
+            <a:off x="685800" y="3124199"/>
+            <a:ext cx="4114800" cy="3094485"/>
           </a:xfrm>
         </p:spPr>
         <p:txBody>
@@ -2096,7 +5190,7 @@
           <a:bodyPr/>
           <a:lstStyle/>
           <a:p>
-            <a:fld id="{822E1C28-B949-4155-BDD8-86A4AEEBA49D}" type="datetimeFigureOut">
+            <a:fld id="{B1781A3E-2305-40A1-8D34-0B9C20277C9F}" type="datetime1">
               <a:rPr lang="en-US" smtClean="0"/>
               <a:t>10/23/2017</a:t>
             </a:fld>
@@ -2149,7 +5243,7 @@
     </p:spTree>
     <p:extLst>
       <p:ext uri="{BB962C8B-B14F-4D97-AF65-F5344CB8AC3E}">
-        <p14:creationId xmlns:p14="http://schemas.microsoft.com/office/powerpoint/2010/main" val="3785315358"/>
+        <p14:creationId xmlns:p14="http://schemas.microsoft.com/office/powerpoint/2010/main" val="1413620062"/>
       </p:ext>
     </p:extLst>
   </p:cSld>
@@ -2188,14 +5282,14 @@
         </p:nvSpPr>
         <p:spPr>
           <a:xfrm>
-            <a:off x="839788" y="457200"/>
-            <a:ext cx="3932237" cy="1600200"/>
+            <a:off x="685800" y="1524000"/>
+            <a:ext cx="6873240" cy="1600200"/>
           </a:xfrm>
         </p:spPr>
         <p:txBody>
           <a:bodyPr anchor="b"/>
           <a:lstStyle>
-            <a:lvl1pPr>
+            <a:lvl1pPr algn="l">
               <a:defRPr sz="3200"/>
             </a:lvl1pPr>
           </a:lstStyle>
@@ -2204,7 +5298,7 @@
               <a:rPr lang="en-US" smtClean="0"/>
               <a:t>Click to edit Master title style</a:t>
             </a:r>
-            <a:endParaRPr lang="en-US"/>
+            <a:endParaRPr lang="en-US" dirty="0"/>
           </a:p>
         </p:txBody>
       </p:sp>
@@ -2212,7 +5306,7 @@
         <p:nvSpPr>
           <p:cNvPr id="3" name="Picture Placeholder 2"/>
           <p:cNvSpPr>
-            <a:spLocks noGrp="1"/>
+            <a:spLocks noGrp="1" noChangeAspect="1"/>
           </p:cNvSpPr>
           <p:nvPr>
             <p:ph type="pic" idx="1"/>
@@ -2220,12 +5314,12 @@
         </p:nvSpPr>
         <p:spPr>
           <a:xfrm>
-            <a:off x="5183188" y="987425"/>
-            <a:ext cx="6172200" cy="4873625"/>
-          </a:xfrm>
-        </p:spPr>
-        <p:txBody>
-          <a:bodyPr/>
+            <a:off x="7861238" y="751241"/>
+            <a:ext cx="3644962" cy="5467443"/>
+          </a:xfrm>
+        </p:spPr>
+        <p:txBody>
+          <a:bodyPr anchor="t"/>
           <a:lstStyle>
             <a:lvl1pPr marL="0" indent="0">
               <a:buNone/>
@@ -2265,7 +5359,11 @@
             </a:lvl9pPr>
           </a:lstStyle>
           <a:p>
-            <a:endParaRPr lang="en-US"/>
+            <a:r>
+              <a:rPr lang="en-US" smtClean="0"/>
+              <a:t>Click icon to add picture</a:t>
+            </a:r>
+            <a:endParaRPr lang="en-US" dirty="0"/>
           </a:p>
         </p:txBody>
       </p:sp>
@@ -2281,8 +5379,8 @@
         </p:nvSpPr>
         <p:spPr>
           <a:xfrm>
-            <a:off x="839788" y="2057400"/>
-            <a:ext cx="3932237" cy="3811588"/>
+            <a:off x="685800" y="3124199"/>
+            <a:ext cx="6873240" cy="3094485"/>
           </a:xfrm>
         </p:spPr>
         <p:txBody>
@@ -2349,7 +5447,7 @@
           <a:bodyPr/>
           <a:lstStyle/>
           <a:p>
-            <a:fld id="{822E1C28-B949-4155-BDD8-86A4AEEBA49D}" type="datetimeFigureOut">
+            <a:fld id="{5B1B5AA8-4544-40D5-9956-960A551D3EBD}" type="datetime1">
               <a:rPr lang="en-US" smtClean="0"/>
               <a:t>10/23/2017</a:t>
             </a:fld>
@@ -2402,7 +5500,7 @@
     </p:spTree>
     <p:extLst>
       <p:ext uri="{BB962C8B-B14F-4D97-AF65-F5344CB8AC3E}">
-        <p14:creationId xmlns:p14="http://schemas.microsoft.com/office/powerpoint/2010/main" val="341063682"/>
+        <p14:creationId xmlns:p14="http://schemas.microsoft.com/office/powerpoint/2010/main" val="3730530029"/>
       </p:ext>
     </p:extLst>
   </p:cSld>
@@ -2434,25 +5532,55 @@
           <a:chExt cx="0" cy="0"/>
         </a:xfrm>
       </p:grpSpPr>
-      <p:sp>
-        <p:nvSpPr>
-          <p:cNvPr id="2" name="Title Placeholder 1"/>
-          <p:cNvSpPr>
-            <a:spLocks noGrp="1"/>
-          </p:cNvSpPr>
-          <p:nvPr>
-            <p:ph type="title"/>
-          </p:nvPr>
-        </p:nvSpPr>
-        <p:spPr>
-          <a:xfrm>
-            <a:off x="838200" y="365125"/>
-            <a:ext cx="10515600" cy="1325563"/>
+      <p:pic>
+        <p:nvPicPr>
+          <p:cNvPr id="7" name="Picture 6" descr="C0-HD-TOP.png"/>
+          <p:cNvPicPr>
+            <a:picLocks noChangeAspect="1"/>
+          </p:cNvPicPr>
+          <p:nvPr/>
+        </p:nvPicPr>
+        <p:blipFill>
+          <a:blip r:embed="rId19">
+            <a:extLst>
+              <a:ext uri="{28A0092B-C50C-407E-A947-70E740481C1C}">
+                <a14:useLocalDpi xmlns:a14="http://schemas.microsoft.com/office/drawing/2010/main" val="0"/>
+              </a:ext>
+            </a:extLst>
+          </a:blip>
+          <a:stretch>
+            <a:fillRect/>
+          </a:stretch>
+        </p:blipFill>
+        <p:spPr>
+          <a:xfrm>
+            <a:off x="0" y="0"/>
+            <a:ext cx="12192000" cy="1441450"/>
           </a:xfrm>
           <a:prstGeom prst="rect">
             <a:avLst/>
           </a:prstGeom>
         </p:spPr>
+      </p:pic>
+      <p:sp>
+        <p:nvSpPr>
+          <p:cNvPr id="2" name="Title Placeholder 1"/>
+          <p:cNvSpPr>
+            <a:spLocks noGrp="1"/>
+          </p:cNvSpPr>
+          <p:nvPr>
+            <p:ph type="title"/>
+          </p:nvPr>
+        </p:nvSpPr>
+        <p:spPr>
+          <a:xfrm>
+            <a:off x="2895600" y="764373"/>
+            <a:ext cx="8610600" cy="1293028"/>
+          </a:xfrm>
+          <a:prstGeom prst="rect">
+            <a:avLst/>
+          </a:prstGeom>
+        </p:spPr>
         <p:txBody>
           <a:bodyPr vert="horz" lIns="91440" tIns="45720" rIns="91440" bIns="45720" rtlCol="0" anchor="ctr">
             <a:normAutofit/>
@@ -2463,7 +5591,7 @@
               <a:rPr lang="en-US" smtClean="0"/>
               <a:t>Click to edit Master title style</a:t>
             </a:r>
-            <a:endParaRPr lang="en-US"/>
+            <a:endParaRPr lang="en-US" dirty="0"/>
           </a:p>
         </p:txBody>
       </p:sp>
@@ -2479,8 +5607,8 @@
         </p:nvSpPr>
         <p:spPr>
           <a:xfrm>
-            <a:off x="838200" y="1825625"/>
-            <a:ext cx="10515600" cy="4351338"/>
+            <a:off x="685800" y="2194560"/>
+            <a:ext cx="10820400" cy="4024125"/>
           </a:xfrm>
           <a:prstGeom prst="rect">
             <a:avLst/>
@@ -2525,7 +5653,7 @@
               <a:rPr lang="en-US" smtClean="0"/>
               <a:t>Fifth level</a:t>
             </a:r>
-            <a:endParaRPr lang="en-US"/>
+            <a:endParaRPr lang="en-US" dirty="0"/>
           </a:p>
         </p:txBody>
       </p:sp>
@@ -2541,8 +5669,8 @@
         </p:nvSpPr>
         <p:spPr>
           <a:xfrm>
-            <a:off x="838200" y="6356350"/>
-            <a:ext cx="2743200" cy="365125"/>
+            <a:off x="8595360" y="6356350"/>
+            <a:ext cx="2910840" cy="365125"/>
           </a:xfrm>
           <a:prstGeom prst="rect">
             <a:avLst/>
@@ -2551,8 +5679,8 @@
         <p:txBody>
           <a:bodyPr vert="horz" lIns="91440" tIns="45720" rIns="91440" bIns="45720" rtlCol="0" anchor="ctr"/>
           <a:lstStyle>
-            <a:lvl1pPr algn="l">
-              <a:defRPr sz="1200">
+            <a:lvl1pPr algn="r">
+              <a:defRPr sz="1050">
                 <a:solidFill>
                   <a:schemeClr val="tx1">
                     <a:tint val="75000"/>
@@ -2562,7 +5690,7 @@
             </a:lvl1pPr>
           </a:lstStyle>
           <a:p>
-            <a:fld id="{822E1C28-B949-4155-BDD8-86A4AEEBA49D}" type="datetimeFigureOut">
+            <a:fld id="{EDDCBDE8-7EB1-47CF-B82F-8EFCEF3AE568}" type="datetime1">
               <a:rPr lang="en-US" smtClean="0"/>
               <a:t>10/23/2017</a:t>
             </a:fld>
@@ -2582,8 +5710,8 @@
         </p:nvSpPr>
         <p:spPr>
           <a:xfrm>
-            <a:off x="4038600" y="6356350"/>
-            <a:ext cx="4114800" cy="365125"/>
+            <a:off x="685800" y="6355845"/>
+            <a:ext cx="7772400" cy="365125"/>
           </a:xfrm>
           <a:prstGeom prst="rect">
             <a:avLst/>
@@ -2592,8 +5720,8 @@
         <p:txBody>
           <a:bodyPr vert="horz" lIns="91440" tIns="45720" rIns="91440" bIns="45720" rtlCol="0" anchor="ctr"/>
           <a:lstStyle>
-            <a:lvl1pPr algn="ctr">
-              <a:defRPr sz="1200">
+            <a:lvl1pPr algn="l">
+              <a:defRPr sz="1050">
                 <a:solidFill>
                   <a:schemeClr val="tx1">
                     <a:tint val="75000"/>
@@ -2619,7 +5747,7 @@
         </p:nvSpPr>
         <p:spPr>
           <a:xfrm>
-            <a:off x="8610600" y="6356350"/>
+            <a:off x="8763000" y="381000"/>
             <a:ext cx="2743200" cy="365125"/>
           </a:xfrm>
           <a:prstGeom prst="rect">
@@ -2630,7 +5758,7 @@
           <a:bodyPr vert="horz" lIns="91440" tIns="45720" rIns="91440" bIns="45720" rtlCol="0" anchor="ctr"/>
           <a:lstStyle>
             <a:lvl1pPr algn="r">
-              <a:defRPr sz="1200">
+              <a:defRPr sz="1050">
                 <a:solidFill>
                   <a:schemeClr val="tx1">
                     <a:tint val="75000"/>
@@ -2651,27 +5779,34 @@
     </p:spTree>
     <p:extLst>
       <p:ext uri="{BB962C8B-B14F-4D97-AF65-F5344CB8AC3E}">
-        <p14:creationId xmlns:p14="http://schemas.microsoft.com/office/powerpoint/2010/main" val="2646703045"/>
+        <p14:creationId xmlns:p14="http://schemas.microsoft.com/office/powerpoint/2010/main" val="160782571"/>
       </p:ext>
     </p:extLst>
   </p:cSld>
-  <p:clrMap bg1="lt1" tx1="dk1" bg2="lt2" tx2="dk2" accent1="accent1" accent2="accent2" accent3="accent3" accent4="accent4" accent5="accent5" accent6="accent6" hlink="hlink" folHlink="folHlink"/>
+  <p:clrMap bg1="dk1" tx1="lt1" bg2="dk2" tx2="lt2" accent1="accent1" accent2="accent2" accent3="accent3" accent4="accent4" accent5="accent5" accent6="accent6" hlink="hlink" folHlink="folHlink"/>
   <p:sldLayoutIdLst>
-    <p:sldLayoutId id="2147483649" r:id="rId1"/>
-    <p:sldLayoutId id="2147483650" r:id="rId2"/>
-    <p:sldLayoutId id="2147483651" r:id="rId3"/>
-    <p:sldLayoutId id="2147483652" r:id="rId4"/>
-    <p:sldLayoutId id="2147483653" r:id="rId5"/>
-    <p:sldLayoutId id="2147483654" r:id="rId6"/>
-    <p:sldLayoutId id="2147483655" r:id="rId7"/>
-    <p:sldLayoutId id="2147483656" r:id="rId8"/>
-    <p:sldLayoutId id="2147483657" r:id="rId9"/>
-    <p:sldLayoutId id="2147483658" r:id="rId10"/>
-    <p:sldLayoutId id="2147483659" r:id="rId11"/>
+    <p:sldLayoutId id="2147483691" r:id="rId1"/>
+    <p:sldLayoutId id="2147483692" r:id="rId2"/>
+    <p:sldLayoutId id="2147483693" r:id="rId3"/>
+    <p:sldLayoutId id="2147483694" r:id="rId4"/>
+    <p:sldLayoutId id="2147483695" r:id="rId5"/>
+    <p:sldLayoutId id="2147483696" r:id="rId6"/>
+    <p:sldLayoutId id="2147483697" r:id="rId7"/>
+    <p:sldLayoutId id="2147483698" r:id="rId8"/>
+    <p:sldLayoutId id="2147483699" r:id="rId9"/>
+    <p:sldLayoutId id="2147483700" r:id="rId10"/>
+    <p:sldLayoutId id="2147483701" r:id="rId11"/>
+    <p:sldLayoutId id="2147483702" r:id="rId12"/>
+    <p:sldLayoutId id="2147483703" r:id="rId13"/>
+    <p:sldLayoutId id="2147483704" r:id="rId14"/>
+    <p:sldLayoutId id="2147483705" r:id="rId15"/>
+    <p:sldLayoutId id="2147483706" r:id="rId16"/>
+    <p:sldLayoutId id="2147483707" r:id="rId17"/>
   </p:sldLayoutIdLst>
+  <p:hf hdr="0" ftr="0" dt="0"/>
   <p:txStyles>
     <p:titleStyle>
-      <a:lvl1pPr algn="l" defTabSz="914400" rtl="0" eaLnBrk="1" latinLnBrk="0" hangingPunct="1">
+      <a:lvl1pPr algn="r" defTabSz="914400" rtl="0" eaLnBrk="1" latinLnBrk="0" hangingPunct="1">
         <a:lnSpc>
           <a:spcPct val="90000"/>
         </a:lnSpc>
@@ -2679,7 +5814,7 @@
           <a:spcPct val="0"/>
         </a:spcBef>
         <a:buNone/>
-        <a:defRPr sz="4400" kern="1200">
+        <a:defRPr sz="4000" kern="1200" cap="all" baseline="0">
           <a:solidFill>
             <a:schemeClr val="tx1"/>
           </a:solidFill>
@@ -2699,7 +5834,7 @@
         </a:spcBef>
         <a:buFont typeface="Arial" panose="020B0604020202020204" pitchFamily="34" charset="0"/>
         <a:buChar char="•"/>
-        <a:defRPr sz="2800" kern="1200">
+        <a:defRPr sz="2200" kern="1200">
           <a:solidFill>
             <a:schemeClr val="tx1"/>
           </a:solidFill>
@@ -2717,7 +5852,7 @@
         </a:spcBef>
         <a:buFont typeface="Arial" panose="020B0604020202020204" pitchFamily="34" charset="0"/>
         <a:buChar char="•"/>
-        <a:defRPr sz="2400" kern="1200">
+        <a:defRPr sz="2000" kern="1200">
           <a:solidFill>
             <a:schemeClr val="tx1"/>
           </a:solidFill>
@@ -2735,7 +5870,7 @@
         </a:spcBef>
         <a:buFont typeface="Arial" panose="020B0604020202020204" pitchFamily="34" charset="0"/>
         <a:buChar char="•"/>
-        <a:defRPr sz="2000" kern="1200">
+        <a:defRPr sz="1800" kern="1200">
           <a:solidFill>
             <a:schemeClr val="tx1"/>
           </a:solidFill>
@@ -2753,7 +5888,7 @@
         </a:spcBef>
         <a:buFont typeface="Arial" panose="020B0604020202020204" pitchFamily="34" charset="0"/>
         <a:buChar char="•"/>
-        <a:defRPr sz="1800" kern="1200">
+        <a:defRPr sz="1600" kern="1200">
           <a:solidFill>
             <a:schemeClr val="tx1"/>
           </a:solidFill>
@@ -2771,7 +5906,7 @@
         </a:spcBef>
         <a:buFont typeface="Arial" panose="020B0604020202020204" pitchFamily="34" charset="0"/>
         <a:buChar char="•"/>
-        <a:defRPr sz="1800" kern="1200">
+        <a:defRPr sz="1600" kern="1200">
           <a:solidFill>
             <a:schemeClr val="tx1"/>
           </a:solidFill>
@@ -2789,7 +5924,7 @@
         </a:spcBef>
         <a:buFont typeface="Arial" panose="020B0604020202020204" pitchFamily="34" charset="0"/>
         <a:buChar char="•"/>
-        <a:defRPr sz="1800" kern="1200">
+        <a:defRPr sz="1600" kern="1200">
           <a:solidFill>
             <a:schemeClr val="tx1"/>
           </a:solidFill>
@@ -2807,7 +5942,7 @@
         </a:spcBef>
         <a:buFont typeface="Arial" panose="020B0604020202020204" pitchFamily="34" charset="0"/>
         <a:buChar char="•"/>
-        <a:defRPr sz="1800" kern="1200">
+        <a:defRPr sz="1600" kern="1200">
           <a:solidFill>
             <a:schemeClr val="tx1"/>
           </a:solidFill>
@@ -2825,7 +5960,7 @@
         </a:spcBef>
         <a:buFont typeface="Arial" panose="020B0604020202020204" pitchFamily="34" charset="0"/>
         <a:buChar char="•"/>
-        <a:defRPr sz="1800" kern="1200">
+        <a:defRPr sz="1600" kern="1200">
           <a:solidFill>
             <a:schemeClr val="tx1"/>
           </a:solidFill>
@@ -2843,7 +5978,7 @@
         </a:spcBef>
         <a:buFont typeface="Arial" panose="020B0604020202020204" pitchFamily="34" charset="0"/>
         <a:buChar char="•"/>
-        <a:defRPr sz="1800" kern="1200">
+        <a:defRPr sz="1600" kern="1200">
           <a:solidFill>
             <a:schemeClr val="tx1"/>
           </a:solidFill>
@@ -3011,6 +6146,30 @@
           <a:bodyPr/>
           <a:lstStyle/>
           <a:p>
+            <a:r>
+              <a:rPr lang="fi-FI" dirty="0" smtClean="0"/>
+              <a:t>”</a:t>
+            </a:r>
+            <a:r>
+              <a:rPr lang="en-US" dirty="0" smtClean="0"/>
+              <a:t>The </a:t>
+            </a:r>
+            <a:r>
+              <a:rPr lang="en-US" dirty="0"/>
+              <a:t>Standard for Embedded </a:t>
+            </a:r>
+            <a:r>
+              <a:rPr lang="en-US" dirty="0" smtClean="0"/>
+              <a:t>Accelerated </a:t>
+            </a:r>
+            <a:r>
+              <a:rPr lang="en-US" dirty="0"/>
+              <a:t>3D </a:t>
+            </a:r>
+            <a:r>
+              <a:rPr lang="en-US" dirty="0" smtClean="0"/>
+              <a:t>Graphics”</a:t>
+            </a:r>
             <a:endParaRPr lang="en-US" dirty="0"/>
           </a:p>
         </p:txBody>
@@ -3093,7 +6252,6 @@
               <a:rPr lang="fi-FI" dirty="0" smtClean="0"/>
               <a:t>2D ja 3D vektorigrafiikka API</a:t>
             </a:r>
-            <a:endParaRPr lang="fi-FI" dirty="0" smtClean="0"/>
           </a:p>
           <a:p>
             <a:r>
@@ -3134,6 +6292,29 @@
               <a:t> 4.6, julkaistu 31.7.2017</a:t>
             </a:r>
             <a:endParaRPr lang="fi-FI" dirty="0"/>
+          </a:p>
+        </p:txBody>
+      </p:sp>
+      <p:sp>
+        <p:nvSpPr>
+          <p:cNvPr id="7" name="Slide Number Placeholder 6"/>
+          <p:cNvSpPr>
+            <a:spLocks noGrp="1"/>
+          </p:cNvSpPr>
+          <p:nvPr>
+            <p:ph type="sldNum" sz="quarter" idx="12"/>
+          </p:nvPr>
+        </p:nvSpPr>
+        <p:spPr/>
+        <p:txBody>
+          <a:bodyPr/>
+          <a:lstStyle/>
+          <a:p>
+            <a:fld id="{6DA7AA4B-8849-44DE-A3E8-A263F985E91B}" type="slidenum">
+              <a:rPr lang="en-US" smtClean="0"/>
+              <a:t>2</a:t>
+            </a:fld>
+            <a:endParaRPr lang="en-US" dirty="0"/>
           </a:p>
         </p:txBody>
       </p:sp>
@@ -3271,6 +6452,29 @@
           </a:p>
         </p:txBody>
       </p:sp>
+      <p:sp>
+        <p:nvSpPr>
+          <p:cNvPr id="7" name="Slide Number Placeholder 6"/>
+          <p:cNvSpPr>
+            <a:spLocks noGrp="1"/>
+          </p:cNvSpPr>
+          <p:nvPr>
+            <p:ph type="sldNum" sz="quarter" idx="12"/>
+          </p:nvPr>
+        </p:nvSpPr>
+        <p:spPr/>
+        <p:txBody>
+          <a:bodyPr/>
+          <a:lstStyle/>
+          <a:p>
+            <a:fld id="{6DA7AA4B-8849-44DE-A3E8-A263F985E91B}" type="slidenum">
+              <a:rPr lang="en-US" smtClean="0"/>
+              <a:t>3</a:t>
+            </a:fld>
+            <a:endParaRPr lang="en-US"/>
+          </a:p>
+        </p:txBody>
+      </p:sp>
     </p:spTree>
     <p:extLst>
       <p:ext uri="{BB962C8B-B14F-4D97-AF65-F5344CB8AC3E}">
@@ -3437,6 +6641,29 @@
               <a:t>Korkea oppimiskynnys</a:t>
             </a:r>
             <a:endParaRPr lang="en-US" dirty="0"/>
+          </a:p>
+        </p:txBody>
+      </p:sp>
+      <p:sp>
+        <p:nvSpPr>
+          <p:cNvPr id="10" name="Slide Number Placeholder 9"/>
+          <p:cNvSpPr>
+            <a:spLocks noGrp="1"/>
+          </p:cNvSpPr>
+          <p:nvPr>
+            <p:ph type="sldNum" sz="quarter" idx="12"/>
+          </p:nvPr>
+        </p:nvSpPr>
+        <p:spPr/>
+        <p:txBody>
+          <a:bodyPr/>
+          <a:lstStyle/>
+          <a:p>
+            <a:fld id="{6DA7AA4B-8849-44DE-A3E8-A263F985E91B}" type="slidenum">
+              <a:rPr lang="en-US" smtClean="0"/>
+              <a:t>4</a:t>
+            </a:fld>
+            <a:endParaRPr lang="en-US"/>
           </a:p>
         </p:txBody>
       </p:sp>
@@ -3608,6 +6835,29 @@
           </a:p>
         </p:txBody>
       </p:sp>
+      <p:sp>
+        <p:nvSpPr>
+          <p:cNvPr id="5" name="Slide Number Placeholder 4"/>
+          <p:cNvSpPr>
+            <a:spLocks noGrp="1"/>
+          </p:cNvSpPr>
+          <p:nvPr>
+            <p:ph type="sldNum" sz="quarter" idx="12"/>
+          </p:nvPr>
+        </p:nvSpPr>
+        <p:spPr/>
+        <p:txBody>
+          <a:bodyPr/>
+          <a:lstStyle/>
+          <a:p>
+            <a:fld id="{6DA7AA4B-8849-44DE-A3E8-A263F985E91B}" type="slidenum">
+              <a:rPr lang="en-US" smtClean="0"/>
+              <a:t>5</a:t>
+            </a:fld>
+            <a:endParaRPr lang="en-US"/>
+          </a:p>
+        </p:txBody>
+      </p:sp>
     </p:spTree>
     <p:extLst>
       <p:ext uri="{BB962C8B-B14F-4D97-AF65-F5344CB8AC3E}">
@@ -3683,6 +6933,29 @@
           </a:p>
         </p:txBody>
       </p:sp>
+      <p:sp>
+        <p:nvSpPr>
+          <p:cNvPr id="7" name="Slide Number Placeholder 6"/>
+          <p:cNvSpPr>
+            <a:spLocks noGrp="1"/>
+          </p:cNvSpPr>
+          <p:nvPr>
+            <p:ph type="sldNum" sz="quarter" idx="12"/>
+          </p:nvPr>
+        </p:nvSpPr>
+        <p:spPr/>
+        <p:txBody>
+          <a:bodyPr/>
+          <a:lstStyle/>
+          <a:p>
+            <a:fld id="{6DA7AA4B-8849-44DE-A3E8-A263F985E91B}" type="slidenum">
+              <a:rPr lang="en-US" smtClean="0"/>
+              <a:t>6</a:t>
+            </a:fld>
+            <a:endParaRPr lang="en-US"/>
+          </a:p>
+        </p:txBody>
+      </p:sp>
     </p:spTree>
     <p:extLst>
       <p:ext uri="{BB962C8B-B14F-4D97-AF65-F5344CB8AC3E}">
@@ -3704,6 +6977,276 @@
 </file>
 
 <file path=ppt/theme/theme1.xml><?xml version="1.0" encoding="utf-8"?>
+<a:theme xmlns:a="http://schemas.openxmlformats.org/drawingml/2006/main" name="Vapor Trail">
+  <a:themeElements>
+    <a:clrScheme name="Vapor Trail">
+      <a:dk1>
+        <a:sysClr val="windowText" lastClr="000000"/>
+      </a:dk1>
+      <a:lt1>
+        <a:sysClr val="window" lastClr="FFFFFF"/>
+      </a:lt1>
+      <a:dk2>
+        <a:srgbClr val="454545"/>
+      </a:dk2>
+      <a:lt2>
+        <a:srgbClr val="DADADA"/>
+      </a:lt2>
+      <a:accent1>
+        <a:srgbClr val="DF2E28"/>
+      </a:accent1>
+      <a:accent2>
+        <a:srgbClr val="FE801A"/>
+      </a:accent2>
+      <a:accent3>
+        <a:srgbClr val="E9BF35"/>
+      </a:accent3>
+      <a:accent4>
+        <a:srgbClr val="81BB42"/>
+      </a:accent4>
+      <a:accent5>
+        <a:srgbClr val="32C7A9"/>
+      </a:accent5>
+      <a:accent6>
+        <a:srgbClr val="4A9BDC"/>
+      </a:accent6>
+      <a:hlink>
+        <a:srgbClr val="F0532B"/>
+      </a:hlink>
+      <a:folHlink>
+        <a:srgbClr val="F38B53"/>
+      </a:folHlink>
+    </a:clrScheme>
+    <a:fontScheme name="Vapor Trail">
+      <a:majorFont>
+        <a:latin typeface="Century Gothic" panose="020B0502020202020204"/>
+        <a:ea typeface=""/>
+        <a:cs typeface=""/>
+        <a:font script="Jpan" typeface="ＭＳ Ｐゴシック"/>
+        <a:font script="Hang" typeface="맑은 고딕"/>
+        <a:font script="Hans" typeface="宋体"/>
+        <a:font script="Hant" typeface="新細明體"/>
+        <a:font script="Arab" typeface="Times New Roman"/>
+        <a:font script="Hebr" typeface="Times New Roman"/>
+        <a:font script="Thai" typeface="Angsana New"/>
+        <a:font script="Ethi" typeface="Nyala"/>
+        <a:font script="Beng" typeface="Vrinda"/>
+        <a:font script="Gujr" typeface="Shruti"/>
+        <a:font script="Khmr" typeface="MoolBoran"/>
+        <a:font script="Knda" typeface="Tunga"/>
+        <a:font script="Guru" typeface="Raavi"/>
+        <a:font script="Cans" typeface="Euphemia"/>
+        <a:font script="Cher" typeface="Plantagenet Cherokee"/>
+        <a:font script="Yiii" typeface="Microsoft Yi Baiti"/>
+        <a:font script="Tibt" typeface="Microsoft Himalaya"/>
+        <a:font script="Thaa" typeface="MV Boli"/>
+        <a:font script="Deva" typeface="Mangal"/>
+        <a:font script="Telu" typeface="Gautami"/>
+        <a:font script="Taml" typeface="Latha"/>
+        <a:font script="Syrc" typeface="Estrangelo Edessa"/>
+        <a:font script="Orya" typeface="Kalinga"/>
+        <a:font script="Mlym" typeface="Kartika"/>
+        <a:font script="Laoo" typeface="DokChampa"/>
+        <a:font script="Sinh" typeface="Iskoola Pota"/>
+        <a:font script="Mong" typeface="Mongolian Baiti"/>
+        <a:font script="Viet" typeface="Times New Roman"/>
+        <a:font script="Uigh" typeface="Microsoft Uighur"/>
+        <a:font script="Geor" typeface="Sylfaen"/>
+      </a:majorFont>
+      <a:minorFont>
+        <a:latin typeface="Century Gothic" panose="020B0502020202020204"/>
+        <a:ea typeface=""/>
+        <a:cs typeface=""/>
+        <a:font script="Jpan" typeface="ＭＳ Ｐゴシック"/>
+        <a:font script="Hang" typeface="맑은 고딕"/>
+        <a:font script="Hans" typeface="宋体"/>
+        <a:font script="Hant" typeface="新細明體"/>
+        <a:font script="Arab" typeface="Arial"/>
+        <a:font script="Hebr" typeface="Arial"/>
+        <a:font script="Thai" typeface="Cordia New"/>
+        <a:font script="Ethi" typeface="Nyala"/>
+        <a:font script="Beng" typeface="Vrinda"/>
+        <a:font script="Gujr" typeface="Shruti"/>
+        <a:font script="Khmr" typeface="DaunPenh"/>
+        <a:font script="Knda" typeface="Tunga"/>
+        <a:font script="Guru" typeface="Raavi"/>
+        <a:font script="Cans" typeface="Euphemia"/>
+        <a:font script="Cher" typeface="Plantagenet Cherokee"/>
+        <a:font script="Yiii" typeface="Microsoft Yi Baiti"/>
+        <a:font script="Tibt" typeface="Microsoft Himalaya"/>
+        <a:font script="Thaa" typeface="MV Boli"/>
+        <a:font script="Deva" typeface="Mangal"/>
+        <a:font script="Telu" typeface="Gautami"/>
+        <a:font script="Taml" typeface="Latha"/>
+        <a:font script="Syrc" typeface="Estrangelo Edessa"/>
+        <a:font script="Orya" typeface="Kalinga"/>
+        <a:font script="Mlym" typeface="Kartika"/>
+        <a:font script="Laoo" typeface="DokChampa"/>
+        <a:font script="Sinh" typeface="Iskoola Pota"/>
+        <a:font script="Mong" typeface="Mongolian Baiti"/>
+        <a:font script="Viet" typeface="Arial"/>
+        <a:font script="Uigh" typeface="Microsoft Uighur"/>
+        <a:font script="Geor" typeface="Sylfaen"/>
+      </a:minorFont>
+    </a:fontScheme>
+    <a:fmtScheme name="Vapor Trail">
+      <a:fillStyleLst>
+        <a:solidFill>
+          <a:schemeClr val="phClr"/>
+        </a:solidFill>
+        <a:gradFill rotWithShape="1">
+          <a:gsLst>
+            <a:gs pos="0">
+              <a:schemeClr val="phClr">
+                <a:tint val="69000"/>
+                <a:alpha val="100000"/>
+                <a:satMod val="109000"/>
+                <a:lumMod val="110000"/>
+              </a:schemeClr>
+            </a:gs>
+            <a:gs pos="52000">
+              <a:schemeClr val="phClr">
+                <a:tint val="74000"/>
+                <a:satMod val="100000"/>
+                <a:lumMod val="104000"/>
+              </a:schemeClr>
+            </a:gs>
+            <a:gs pos="100000">
+              <a:schemeClr val="phClr">
+                <a:tint val="78000"/>
+                <a:satMod val="100000"/>
+                <a:lumMod val="100000"/>
+              </a:schemeClr>
+            </a:gs>
+          </a:gsLst>
+          <a:lin ang="5400000" scaled="0"/>
+        </a:gradFill>
+        <a:gradFill rotWithShape="1">
+          <a:gsLst>
+            <a:gs pos="0">
+              <a:schemeClr val="phClr">
+                <a:tint val="96000"/>
+                <a:satMod val="100000"/>
+                <a:lumMod val="104000"/>
+              </a:schemeClr>
+            </a:gs>
+            <a:gs pos="78000">
+              <a:schemeClr val="phClr">
+                <a:shade val="100000"/>
+                <a:satMod val="110000"/>
+                <a:lumMod val="100000"/>
+              </a:schemeClr>
+            </a:gs>
+          </a:gsLst>
+          <a:lin ang="5400000" scaled="0"/>
+        </a:gradFill>
+      </a:fillStyleLst>
+      <a:lnStyleLst>
+        <a:ln w="9525" cap="flat" cmpd="sng" algn="ctr">
+          <a:solidFill>
+            <a:schemeClr val="phClr"/>
+          </a:solidFill>
+          <a:prstDash val="solid"/>
+        </a:ln>
+        <a:ln w="12700" cap="flat" cmpd="sng" algn="ctr">
+          <a:solidFill>
+            <a:schemeClr val="phClr"/>
+          </a:solidFill>
+          <a:prstDash val="solid"/>
+        </a:ln>
+        <a:ln w="19050" cap="flat" cmpd="sng" algn="ctr">
+          <a:solidFill>
+            <a:schemeClr val="phClr"/>
+          </a:solidFill>
+          <a:prstDash val="solid"/>
+        </a:ln>
+      </a:lnStyleLst>
+      <a:effectStyleLst>
+        <a:effectStyle>
+          <a:effectLst/>
+        </a:effectStyle>
+        <a:effectStyle>
+          <a:effectLst/>
+          <a:scene3d>
+            <a:camera prst="orthographicFront">
+              <a:rot lat="0" lon="0" rev="0"/>
+            </a:camera>
+            <a:lightRig rig="threePt" dir="t"/>
+          </a:scene3d>
+          <a:sp3d>
+            <a:bevelT w="25400" h="12700"/>
+          </a:sp3d>
+        </a:effectStyle>
+        <a:effectStyle>
+          <a:effectLst>
+            <a:outerShdw blurRad="57150" dist="19050" dir="5400000" algn="ctr" rotWithShape="0">
+              <a:srgbClr val="000000">
+                <a:alpha val="48000"/>
+              </a:srgbClr>
+            </a:outerShdw>
+          </a:effectLst>
+          <a:scene3d>
+            <a:camera prst="orthographicFront">
+              <a:rot lat="0" lon="0" rev="0"/>
+            </a:camera>
+            <a:lightRig rig="threePt" dir="t"/>
+          </a:scene3d>
+          <a:sp3d>
+            <a:bevelT w="50800" h="25400"/>
+          </a:sp3d>
+        </a:effectStyle>
+      </a:effectStyleLst>
+      <a:bgFillStyleLst>
+        <a:solidFill>
+          <a:schemeClr val="phClr"/>
+        </a:solidFill>
+        <a:solidFill>
+          <a:schemeClr val="phClr">
+            <a:tint val="95000"/>
+            <a:satMod val="170000"/>
+          </a:schemeClr>
+        </a:solidFill>
+        <a:gradFill rotWithShape="1">
+          <a:gsLst>
+            <a:gs pos="0">
+              <a:schemeClr val="phClr">
+                <a:tint val="93000"/>
+                <a:shade val="98000"/>
+                <a:satMod val="150000"/>
+                <a:lumMod val="102000"/>
+              </a:schemeClr>
+            </a:gs>
+            <a:gs pos="50000">
+              <a:schemeClr val="phClr">
+                <a:tint val="98000"/>
+                <a:shade val="90000"/>
+                <a:satMod val="130000"/>
+                <a:lumMod val="103000"/>
+              </a:schemeClr>
+            </a:gs>
+            <a:gs pos="100000">
+              <a:schemeClr val="phClr">
+                <a:shade val="63000"/>
+                <a:satMod val="120000"/>
+              </a:schemeClr>
+            </a:gs>
+          </a:gsLst>
+          <a:lin ang="5400000" scaled="0"/>
+        </a:gradFill>
+      </a:bgFillStyleLst>
+    </a:fmtScheme>
+  </a:themeElements>
+  <a:objectDefaults/>
+  <a:extraClrSchemeLst/>
+  <a:extLst>
+    <a:ext uri="{05A4C25C-085E-4340-85A3-A5531E510DB2}">
+      <thm15:themeFamily xmlns:thm15="http://schemas.microsoft.com/office/thememl/2012/main" name="Vapor Trail" id="{4FDF2955-7D9C-493C-B9F9-C205151B46CD}" vid="{8F31A783-2159-4870-BC29-2BA7D038EA44}"/>
+    </a:ext>
+  </a:extLst>
+</a:theme>
+</file>
+
+<file path=ppt/theme/theme2.xml><?xml version="1.0" encoding="utf-8"?>
 <a:theme xmlns:a="http://schemas.openxmlformats.org/drawingml/2006/main" name="Office Theme">
   <a:themeElements>
     <a:clrScheme name="Office">

</xml_diff>

<commit_message>
decoration add, buildingtype fk up
</commit_message>
<xml_diff>
--- a/presentation/OpenGL ES 3.pptx
+++ b/presentation/OpenGL ES 3.pptx
@@ -6587,6 +6587,10 @@
             </a:r>
           </a:p>
           <a:p>
+            <a:r>
+              <a:rPr lang="fi-FI" dirty="0" smtClean="0"/>
+              <a:t>Saa paremman ymmärryksen miten GPU toimii</a:t>
+            </a:r>
             <a:endParaRPr lang="en-US" dirty="0"/>
           </a:p>
         </p:txBody>

</xml_diff>